<commit_message>
Add a figure and better guide for fabric configuration (both kubectl and Ansible)
Signed-off-by: Josh Kneubuhl <jkneubuh@us.ibm.com>
</commit_message>
<xml_diff>
--- a/docs/images/CloudReady.pptx
+++ b/docs/images/CloudReady.pptx
@@ -9,6 +9,7 @@
     <p:sldId id="260" r:id="rId3"/>
     <p:sldId id="261" r:id="rId4"/>
     <p:sldId id="262" r:id="rId5"/>
+    <p:sldId id="263" r:id="rId6"/>
   </p:sldIdLst>
   <p:sldSz cx="12192000" cy="6858000"/>
   <p:notesSz cx="6858000" cy="9144000"/>
@@ -6086,6 +6087,1052 @@
 </p:sld>
 </file>
 
+<file path=ppt/slides/slide5.xml><?xml version="1.0" encoding="utf-8"?>
+<p:sld xmlns:a="http://schemas.openxmlformats.org/drawingml/2006/main" xmlns:r="http://schemas.openxmlformats.org/officeDocument/2006/relationships" xmlns:p="http://schemas.openxmlformats.org/presentationml/2006/main">
+  <p:cSld>
+    <p:spTree>
+      <p:nvGrpSpPr>
+        <p:cNvPr id="1" name=""/>
+        <p:cNvGrpSpPr/>
+        <p:nvPr/>
+      </p:nvGrpSpPr>
+      <p:grpSpPr>
+        <a:xfrm>
+          <a:off x="0" y="0"/>
+          <a:ext cx="0" cy="0"/>
+          <a:chOff x="0" y="0"/>
+          <a:chExt cx="0" cy="0"/>
+        </a:xfrm>
+      </p:grpSpPr>
+      <p:sp>
+        <p:nvSpPr>
+          <p:cNvPr id="5" name="Rounded Rectangle 4">
+            <a:extLst>
+              <a:ext uri="{FF2B5EF4-FFF2-40B4-BE49-F238E27FC236}">
+                <a16:creationId xmlns:a16="http://schemas.microsoft.com/office/drawing/2014/main" id="{13976EB2-D6C7-3AF3-0958-43EF32AFB41A}"/>
+              </a:ext>
+            </a:extLst>
+          </p:cNvPr>
+          <p:cNvSpPr/>
+          <p:nvPr/>
+        </p:nvSpPr>
+        <p:spPr>
+          <a:xfrm>
+            <a:off x="4842089" y="3043374"/>
+            <a:ext cx="4667671" cy="2653749"/>
+          </a:xfrm>
+          <a:prstGeom prst="roundRect">
+            <a:avLst/>
+          </a:prstGeom>
+          <a:noFill/>
+          <a:ln>
+            <a:solidFill>
+              <a:schemeClr val="tx2">
+                <a:lumMod val="40000"/>
+                <a:lumOff val="60000"/>
+              </a:schemeClr>
+            </a:solidFill>
+          </a:ln>
+        </p:spPr>
+        <p:style>
+          <a:lnRef idx="2">
+            <a:schemeClr val="accent1">
+              <a:shade val="50000"/>
+            </a:schemeClr>
+          </a:lnRef>
+          <a:fillRef idx="1">
+            <a:schemeClr val="accent1"/>
+          </a:fillRef>
+          <a:effectRef idx="0">
+            <a:schemeClr val="accent1"/>
+          </a:effectRef>
+          <a:fontRef idx="minor">
+            <a:schemeClr val="lt1"/>
+          </a:fontRef>
+        </p:style>
+        <p:txBody>
+          <a:bodyPr rtlCol="0" anchor="ctr"/>
+          <a:lstStyle/>
+          <a:p>
+            <a:pPr algn="ctr"/>
+            <a:endParaRPr lang="en-US"/>
+          </a:p>
+        </p:txBody>
+      </p:sp>
+      <p:sp>
+        <p:nvSpPr>
+          <p:cNvPr id="21" name="TextBox 20">
+            <a:extLst>
+              <a:ext uri="{FF2B5EF4-FFF2-40B4-BE49-F238E27FC236}">
+                <a16:creationId xmlns:a16="http://schemas.microsoft.com/office/drawing/2014/main" id="{CC8BBE54-5321-369A-E697-C79336B5F269}"/>
+              </a:ext>
+            </a:extLst>
+          </p:cNvPr>
+          <p:cNvSpPr txBox="1"/>
+          <p:nvPr/>
+        </p:nvSpPr>
+        <p:spPr>
+          <a:xfrm>
+            <a:off x="12322435" y="3517510"/>
+            <a:ext cx="654346" cy="369332"/>
+          </a:xfrm>
+          <a:prstGeom prst="rect">
+            <a:avLst/>
+          </a:prstGeom>
+          <a:noFill/>
+        </p:spPr>
+        <p:txBody>
+          <a:bodyPr wrap="none" rtlCol="0">
+            <a:spAutoFit/>
+          </a:bodyPr>
+          <a:lstStyle/>
+          <a:p>
+            <a:r>
+              <a:rPr lang="en-US"/>
+              <a:t>KIND</a:t>
+            </a:r>
+          </a:p>
+        </p:txBody>
+      </p:sp>
+      <p:sp>
+        <p:nvSpPr>
+          <p:cNvPr id="2" name="TextBox 1">
+            <a:extLst>
+              <a:ext uri="{FF2B5EF4-FFF2-40B4-BE49-F238E27FC236}">
+                <a16:creationId xmlns:a16="http://schemas.microsoft.com/office/drawing/2014/main" id="{86F17F79-3093-C5AB-2B22-C4068E5CD791}"/>
+              </a:ext>
+            </a:extLst>
+          </p:cNvPr>
+          <p:cNvSpPr txBox="1"/>
+          <p:nvPr/>
+        </p:nvSpPr>
+        <p:spPr>
+          <a:xfrm>
+            <a:off x="198783" y="168965"/>
+            <a:ext cx="1380378" cy="369332"/>
+          </a:xfrm>
+          <a:prstGeom prst="rect">
+            <a:avLst/>
+          </a:prstGeom>
+          <a:noFill/>
+        </p:spPr>
+        <p:txBody>
+          <a:bodyPr wrap="none" rtlCol="0">
+            <a:spAutoFit/>
+          </a:bodyPr>
+          <a:lstStyle/>
+          <a:p>
+            <a:r>
+              <a:rPr lang="en-US"/>
+              <a:t>20-fabric.md</a:t>
+            </a:r>
+          </a:p>
+        </p:txBody>
+      </p:sp>
+      <p:pic>
+        <p:nvPicPr>
+          <p:cNvPr id="17" name="Picture 8">
+            <a:extLst>
+              <a:ext uri="{FF2B5EF4-FFF2-40B4-BE49-F238E27FC236}">
+                <a16:creationId xmlns:a16="http://schemas.microsoft.com/office/drawing/2014/main" id="{22A53A60-23E1-AA24-7D1D-7F819EDBAC69}"/>
+              </a:ext>
+            </a:extLst>
+          </p:cNvPr>
+          <p:cNvPicPr>
+            <a:picLocks noChangeAspect="1" noChangeArrowheads="1"/>
+          </p:cNvPicPr>
+          <p:nvPr/>
+        </p:nvPicPr>
+        <p:blipFill>
+          <a:blip r:embed="rId2">
+            <a:extLst>
+              <a:ext uri="{28A0092B-C50C-407E-A947-70E740481C1C}">
+                <a14:useLocalDpi xmlns:a14="http://schemas.microsoft.com/office/drawing/2010/main" val="0"/>
+              </a:ext>
+            </a:extLst>
+          </a:blip>
+          <a:srcRect/>
+          <a:stretch>
+            <a:fillRect/>
+          </a:stretch>
+        </p:blipFill>
+        <p:spPr bwMode="auto">
+          <a:xfrm>
+            <a:off x="4554926" y="4627257"/>
+            <a:ext cx="574326" cy="556379"/>
+          </a:xfrm>
+          <a:prstGeom prst="rect">
+            <a:avLst/>
+          </a:prstGeom>
+          <a:noFill/>
+          <a:extLst>
+            <a:ext uri="{909E8E84-426E-40DD-AFC4-6F175D3DCCD1}">
+              <a14:hiddenFill xmlns:a14="http://schemas.microsoft.com/office/drawing/2010/main">
+                <a:solidFill>
+                  <a:srgbClr val="FFFFFF"/>
+                </a:solidFill>
+              </a14:hiddenFill>
+            </a:ext>
+          </a:extLst>
+        </p:spPr>
+      </p:pic>
+      <p:pic>
+        <p:nvPicPr>
+          <p:cNvPr id="1026" name="Picture 2">
+            <a:extLst>
+              <a:ext uri="{FF2B5EF4-FFF2-40B4-BE49-F238E27FC236}">
+                <a16:creationId xmlns:a16="http://schemas.microsoft.com/office/drawing/2014/main" id="{2E1F957D-26BD-3C84-B69F-1514CEF7326E}"/>
+              </a:ext>
+            </a:extLst>
+          </p:cNvPr>
+          <p:cNvPicPr>
+            <a:picLocks noChangeAspect="1" noChangeArrowheads="1"/>
+          </p:cNvPicPr>
+          <p:nvPr/>
+        </p:nvPicPr>
+        <p:blipFill>
+          <a:blip r:embed="rId3">
+            <a:extLst>
+              <a:ext uri="{28A0092B-C50C-407E-A947-70E740481C1C}">
+                <a14:useLocalDpi xmlns:a14="http://schemas.microsoft.com/office/drawing/2010/main" val="0"/>
+              </a:ext>
+            </a:extLst>
+          </a:blip>
+          <a:srcRect/>
+          <a:stretch>
+            <a:fillRect/>
+          </a:stretch>
+        </p:blipFill>
+        <p:spPr bwMode="auto">
+          <a:xfrm>
+            <a:off x="5628874" y="3245295"/>
+            <a:ext cx="574327" cy="556379"/>
+          </a:xfrm>
+          <a:prstGeom prst="rect">
+            <a:avLst/>
+          </a:prstGeom>
+          <a:noFill/>
+          <a:extLst>
+            <a:ext uri="{909E8E84-426E-40DD-AFC4-6F175D3DCCD1}">
+              <a14:hiddenFill xmlns:a14="http://schemas.microsoft.com/office/drawing/2010/main">
+                <a:solidFill>
+                  <a:srgbClr val="FFFFFF"/>
+                </a:solidFill>
+              </a14:hiddenFill>
+            </a:ext>
+          </a:extLst>
+        </p:spPr>
+      </p:pic>
+      <p:cxnSp>
+        <p:nvCxnSpPr>
+          <p:cNvPr id="43" name="Elbow Connector 42">
+            <a:extLst>
+              <a:ext uri="{FF2B5EF4-FFF2-40B4-BE49-F238E27FC236}">
+                <a16:creationId xmlns:a16="http://schemas.microsoft.com/office/drawing/2014/main" id="{0548E2CF-5227-F17F-7513-B3443F64FF92}"/>
+              </a:ext>
+            </a:extLst>
+          </p:cNvPr>
+          <p:cNvCxnSpPr>
+            <a:cxnSpLocks/>
+            <a:stCxn id="1029" idx="3"/>
+            <a:endCxn id="17" idx="1"/>
+          </p:cNvCxnSpPr>
+          <p:nvPr/>
+        </p:nvCxnSpPr>
+        <p:spPr>
+          <a:xfrm>
+            <a:off x="3898206" y="4905446"/>
+            <a:ext cx="656720" cy="1"/>
+          </a:xfrm>
+          <a:prstGeom prst="bentConnector3">
+            <a:avLst>
+              <a:gd name="adj1" fmla="val 50000"/>
+            </a:avLst>
+          </a:prstGeom>
+          <a:ln>
+            <a:solidFill>
+              <a:schemeClr val="accent2"/>
+            </a:solidFill>
+          </a:ln>
+        </p:spPr>
+        <p:style>
+          <a:lnRef idx="1">
+            <a:schemeClr val="accent1"/>
+          </a:lnRef>
+          <a:fillRef idx="0">
+            <a:schemeClr val="accent1"/>
+          </a:fillRef>
+          <a:effectRef idx="0">
+            <a:schemeClr val="accent1"/>
+          </a:effectRef>
+          <a:fontRef idx="minor">
+            <a:schemeClr val="tx1"/>
+          </a:fontRef>
+        </p:style>
+      </p:cxnSp>
+      <p:sp>
+        <p:nvSpPr>
+          <p:cNvPr id="6" name="Rounded Rectangle 5">
+            <a:extLst>
+              <a:ext uri="{FF2B5EF4-FFF2-40B4-BE49-F238E27FC236}">
+                <a16:creationId xmlns:a16="http://schemas.microsoft.com/office/drawing/2014/main" id="{29505850-5440-EC14-D34B-5180E9DF972E}"/>
+              </a:ext>
+            </a:extLst>
+          </p:cNvPr>
+          <p:cNvSpPr/>
+          <p:nvPr/>
+        </p:nvSpPr>
+        <p:spPr>
+          <a:xfrm>
+            <a:off x="7318266" y="4627257"/>
+            <a:ext cx="1789044" cy="556379"/>
+          </a:xfrm>
+          <a:prstGeom prst="roundRect">
+            <a:avLst/>
+          </a:prstGeom>
+          <a:solidFill>
+            <a:srgbClr val="7030A0"/>
+          </a:solidFill>
+        </p:spPr>
+        <p:style>
+          <a:lnRef idx="2">
+            <a:schemeClr val="accent1">
+              <a:shade val="50000"/>
+            </a:schemeClr>
+          </a:lnRef>
+          <a:fillRef idx="1">
+            <a:schemeClr val="accent1"/>
+          </a:fillRef>
+          <a:effectRef idx="0">
+            <a:schemeClr val="accent1"/>
+          </a:effectRef>
+          <a:fontRef idx="minor">
+            <a:schemeClr val="lt1"/>
+          </a:fontRef>
+        </p:style>
+        <p:txBody>
+          <a:bodyPr rtlCol="0" anchor="ctr"/>
+          <a:lstStyle/>
+          <a:p>
+            <a:pPr algn="ctr"/>
+            <a:r>
+              <a:rPr lang="en-US" sz="1600" b="1"/>
+              <a:t>fabric-operator</a:t>
+            </a:r>
+          </a:p>
+        </p:txBody>
+      </p:sp>
+      <p:pic>
+        <p:nvPicPr>
+          <p:cNvPr id="1028" name="Picture 4">
+            <a:extLst>
+              <a:ext uri="{FF2B5EF4-FFF2-40B4-BE49-F238E27FC236}">
+                <a16:creationId xmlns:a16="http://schemas.microsoft.com/office/drawing/2014/main" id="{C0F00DD8-A741-280A-F2F4-8AB5AD0D725F}"/>
+              </a:ext>
+            </a:extLst>
+          </p:cNvPr>
+          <p:cNvPicPr>
+            <a:picLocks noChangeAspect="1" noChangeArrowheads="1"/>
+          </p:cNvPicPr>
+          <p:nvPr/>
+        </p:nvPicPr>
+        <p:blipFill>
+          <a:blip r:embed="rId4">
+            <a:extLst>
+              <a:ext uri="{28A0092B-C50C-407E-A947-70E740481C1C}">
+                <a14:useLocalDpi xmlns:a14="http://schemas.microsoft.com/office/drawing/2010/main" val="0"/>
+              </a:ext>
+            </a:extLst>
+          </a:blip>
+          <a:srcRect/>
+          <a:stretch>
+            <a:fillRect/>
+          </a:stretch>
+        </p:blipFill>
+        <p:spPr bwMode="auto">
+          <a:xfrm>
+            <a:off x="5711852" y="4393271"/>
+            <a:ext cx="574888" cy="556923"/>
+          </a:xfrm>
+          <a:prstGeom prst="rect">
+            <a:avLst/>
+          </a:prstGeom>
+          <a:noFill/>
+          <a:extLst>
+            <a:ext uri="{909E8E84-426E-40DD-AFC4-6F175D3DCCD1}">
+              <a14:hiddenFill xmlns:a14="http://schemas.microsoft.com/office/drawing/2010/main">
+                <a:solidFill>
+                  <a:srgbClr val="FFFFFF"/>
+                </a:solidFill>
+              </a14:hiddenFill>
+            </a:ext>
+          </a:extLst>
+        </p:spPr>
+      </p:pic>
+      <p:pic>
+        <p:nvPicPr>
+          <p:cNvPr id="7" name="Picture 4">
+            <a:extLst>
+              <a:ext uri="{FF2B5EF4-FFF2-40B4-BE49-F238E27FC236}">
+                <a16:creationId xmlns:a16="http://schemas.microsoft.com/office/drawing/2014/main" id="{7CA6E679-7BEA-1578-23BE-F7A2BCF29C47}"/>
+              </a:ext>
+            </a:extLst>
+          </p:cNvPr>
+          <p:cNvPicPr>
+            <a:picLocks noChangeAspect="1" noChangeArrowheads="1"/>
+          </p:cNvPicPr>
+          <p:nvPr/>
+        </p:nvPicPr>
+        <p:blipFill>
+          <a:blip r:embed="rId4">
+            <a:extLst>
+              <a:ext uri="{28A0092B-C50C-407E-A947-70E740481C1C}">
+                <a14:useLocalDpi xmlns:a14="http://schemas.microsoft.com/office/drawing/2010/main" val="0"/>
+              </a:ext>
+            </a:extLst>
+          </a:blip>
+          <a:srcRect/>
+          <a:stretch>
+            <a:fillRect/>
+          </a:stretch>
+        </p:blipFill>
+        <p:spPr bwMode="auto">
+          <a:xfrm>
+            <a:off x="5864252" y="4545671"/>
+            <a:ext cx="574888" cy="556923"/>
+          </a:xfrm>
+          <a:prstGeom prst="rect">
+            <a:avLst/>
+          </a:prstGeom>
+          <a:noFill/>
+          <a:extLst>
+            <a:ext uri="{909E8E84-426E-40DD-AFC4-6F175D3DCCD1}">
+              <a14:hiddenFill xmlns:a14="http://schemas.microsoft.com/office/drawing/2010/main">
+                <a:solidFill>
+                  <a:srgbClr val="FFFFFF"/>
+                </a:solidFill>
+              </a14:hiddenFill>
+            </a:ext>
+          </a:extLst>
+        </p:spPr>
+      </p:pic>
+      <p:pic>
+        <p:nvPicPr>
+          <p:cNvPr id="9" name="Picture 4">
+            <a:extLst>
+              <a:ext uri="{FF2B5EF4-FFF2-40B4-BE49-F238E27FC236}">
+                <a16:creationId xmlns:a16="http://schemas.microsoft.com/office/drawing/2014/main" id="{5944F262-DAC1-8F20-9FF5-36480A2482EC}"/>
+              </a:ext>
+            </a:extLst>
+          </p:cNvPr>
+          <p:cNvPicPr>
+            <a:picLocks noChangeAspect="1" noChangeArrowheads="1"/>
+          </p:cNvPicPr>
+          <p:nvPr/>
+        </p:nvPicPr>
+        <p:blipFill>
+          <a:blip r:embed="rId4">
+            <a:extLst>
+              <a:ext uri="{28A0092B-C50C-407E-A947-70E740481C1C}">
+                <a14:useLocalDpi xmlns:a14="http://schemas.microsoft.com/office/drawing/2010/main" val="0"/>
+              </a:ext>
+            </a:extLst>
+          </a:blip>
+          <a:srcRect/>
+          <a:stretch>
+            <a:fillRect/>
+          </a:stretch>
+        </p:blipFill>
+        <p:spPr bwMode="auto">
+          <a:xfrm>
+            <a:off x="6016652" y="4698071"/>
+            <a:ext cx="574888" cy="556923"/>
+          </a:xfrm>
+          <a:prstGeom prst="rect">
+            <a:avLst/>
+          </a:prstGeom>
+          <a:noFill/>
+          <a:extLst>
+            <a:ext uri="{909E8E84-426E-40DD-AFC4-6F175D3DCCD1}">
+              <a14:hiddenFill xmlns:a14="http://schemas.microsoft.com/office/drawing/2010/main">
+                <a:solidFill>
+                  <a:srgbClr val="FFFFFF"/>
+                </a:solidFill>
+              </a14:hiddenFill>
+            </a:ext>
+          </a:extLst>
+        </p:spPr>
+      </p:pic>
+      <p:pic>
+        <p:nvPicPr>
+          <p:cNvPr id="10" name="Picture 4">
+            <a:extLst>
+              <a:ext uri="{FF2B5EF4-FFF2-40B4-BE49-F238E27FC236}">
+                <a16:creationId xmlns:a16="http://schemas.microsoft.com/office/drawing/2014/main" id="{A06B4A05-D280-1A1F-393F-49B1CFA1DDE5}"/>
+              </a:ext>
+            </a:extLst>
+          </p:cNvPr>
+          <p:cNvPicPr>
+            <a:picLocks noChangeAspect="1" noChangeArrowheads="1"/>
+          </p:cNvPicPr>
+          <p:nvPr/>
+        </p:nvPicPr>
+        <p:blipFill>
+          <a:blip r:embed="rId4">
+            <a:extLst>
+              <a:ext uri="{28A0092B-C50C-407E-A947-70E740481C1C}">
+                <a14:useLocalDpi xmlns:a14="http://schemas.microsoft.com/office/drawing/2010/main" val="0"/>
+              </a:ext>
+            </a:extLst>
+          </a:blip>
+          <a:srcRect/>
+          <a:stretch>
+            <a:fillRect/>
+          </a:stretch>
+        </p:blipFill>
+        <p:spPr bwMode="auto">
+          <a:xfrm>
+            <a:off x="6169052" y="4850471"/>
+            <a:ext cx="574888" cy="556923"/>
+          </a:xfrm>
+          <a:prstGeom prst="rect">
+            <a:avLst/>
+          </a:prstGeom>
+          <a:noFill/>
+          <a:extLst>
+            <a:ext uri="{909E8E84-426E-40DD-AFC4-6F175D3DCCD1}">
+              <a14:hiddenFill xmlns:a14="http://schemas.microsoft.com/office/drawing/2010/main">
+                <a:solidFill>
+                  <a:srgbClr val="FFFFFF"/>
+                </a:solidFill>
+              </a14:hiddenFill>
+            </a:ext>
+          </a:extLst>
+        </p:spPr>
+      </p:pic>
+      <p:cxnSp>
+        <p:nvCxnSpPr>
+          <p:cNvPr id="11" name="Elbow Connector 10">
+            <a:extLst>
+              <a:ext uri="{FF2B5EF4-FFF2-40B4-BE49-F238E27FC236}">
+                <a16:creationId xmlns:a16="http://schemas.microsoft.com/office/drawing/2014/main" id="{DA688AB3-686B-6BE1-EA70-D43805355EE6}"/>
+              </a:ext>
+            </a:extLst>
+          </p:cNvPr>
+          <p:cNvCxnSpPr>
+            <a:cxnSpLocks/>
+            <a:stCxn id="1024" idx="3"/>
+            <a:endCxn id="1026" idx="1"/>
+          </p:cNvCxnSpPr>
+          <p:nvPr/>
+        </p:nvCxnSpPr>
+        <p:spPr>
+          <a:xfrm flipV="1">
+            <a:off x="3892756" y="3523485"/>
+            <a:ext cx="1736118" cy="6362"/>
+          </a:xfrm>
+          <a:prstGeom prst="bentConnector3">
+            <a:avLst>
+              <a:gd name="adj1" fmla="val 50000"/>
+            </a:avLst>
+          </a:prstGeom>
+          <a:ln>
+            <a:solidFill>
+              <a:schemeClr val="accent2"/>
+            </a:solidFill>
+          </a:ln>
+        </p:spPr>
+        <p:style>
+          <a:lnRef idx="1">
+            <a:schemeClr val="accent1"/>
+          </a:lnRef>
+          <a:fillRef idx="0">
+            <a:schemeClr val="accent1"/>
+          </a:fillRef>
+          <a:effectRef idx="0">
+            <a:schemeClr val="accent1"/>
+          </a:effectRef>
+          <a:fontRef idx="minor">
+            <a:schemeClr val="tx1"/>
+          </a:fontRef>
+        </p:style>
+      </p:cxnSp>
+      <p:cxnSp>
+        <p:nvCxnSpPr>
+          <p:cNvPr id="24" name="Elbow Connector 23">
+            <a:extLst>
+              <a:ext uri="{FF2B5EF4-FFF2-40B4-BE49-F238E27FC236}">
+                <a16:creationId xmlns:a16="http://schemas.microsoft.com/office/drawing/2014/main" id="{A6545725-2F92-B67B-E278-B74AC288EDA7}"/>
+              </a:ext>
+            </a:extLst>
+          </p:cNvPr>
+          <p:cNvCxnSpPr>
+            <a:cxnSpLocks/>
+            <a:stCxn id="17" idx="3"/>
+            <a:endCxn id="1028" idx="1"/>
+          </p:cNvCxnSpPr>
+          <p:nvPr/>
+        </p:nvCxnSpPr>
+        <p:spPr>
+          <a:xfrm flipV="1">
+            <a:off x="5129252" y="4671733"/>
+            <a:ext cx="582600" cy="233714"/>
+          </a:xfrm>
+          <a:prstGeom prst="bentConnector3">
+            <a:avLst>
+              <a:gd name="adj1" fmla="val 68110"/>
+            </a:avLst>
+          </a:prstGeom>
+          <a:ln>
+            <a:solidFill>
+              <a:schemeClr val="accent6">
+                <a:lumMod val="50000"/>
+              </a:schemeClr>
+            </a:solidFill>
+            <a:prstDash val="dash"/>
+          </a:ln>
+        </p:spPr>
+        <p:style>
+          <a:lnRef idx="1">
+            <a:schemeClr val="accent1"/>
+          </a:lnRef>
+          <a:fillRef idx="0">
+            <a:schemeClr val="accent1"/>
+          </a:fillRef>
+          <a:effectRef idx="0">
+            <a:schemeClr val="accent1"/>
+          </a:effectRef>
+          <a:fontRef idx="minor">
+            <a:schemeClr val="tx1"/>
+          </a:fontRef>
+        </p:style>
+      </p:cxnSp>
+      <p:cxnSp>
+        <p:nvCxnSpPr>
+          <p:cNvPr id="29" name="Elbow Connector 28">
+            <a:extLst>
+              <a:ext uri="{FF2B5EF4-FFF2-40B4-BE49-F238E27FC236}">
+                <a16:creationId xmlns:a16="http://schemas.microsoft.com/office/drawing/2014/main" id="{5E3DCAD8-6ADC-3E31-A9C8-72585D089019}"/>
+              </a:ext>
+            </a:extLst>
+          </p:cNvPr>
+          <p:cNvCxnSpPr>
+            <a:cxnSpLocks/>
+            <a:stCxn id="17" idx="3"/>
+            <a:endCxn id="10" idx="1"/>
+          </p:cNvCxnSpPr>
+          <p:nvPr/>
+        </p:nvCxnSpPr>
+        <p:spPr>
+          <a:xfrm>
+            <a:off x="5129252" y="4905447"/>
+            <a:ext cx="1039800" cy="223486"/>
+          </a:xfrm>
+          <a:prstGeom prst="bentConnector3">
+            <a:avLst>
+              <a:gd name="adj1" fmla="val 38500"/>
+            </a:avLst>
+          </a:prstGeom>
+          <a:ln>
+            <a:solidFill>
+              <a:schemeClr val="accent6">
+                <a:lumMod val="50000"/>
+              </a:schemeClr>
+            </a:solidFill>
+            <a:prstDash val="dash"/>
+          </a:ln>
+        </p:spPr>
+        <p:style>
+          <a:lnRef idx="1">
+            <a:schemeClr val="accent1"/>
+          </a:lnRef>
+          <a:fillRef idx="0">
+            <a:schemeClr val="accent1"/>
+          </a:fillRef>
+          <a:effectRef idx="0">
+            <a:schemeClr val="accent1"/>
+          </a:effectRef>
+          <a:fontRef idx="minor">
+            <a:schemeClr val="tx1"/>
+          </a:fontRef>
+        </p:style>
+      </p:cxnSp>
+      <p:cxnSp>
+        <p:nvCxnSpPr>
+          <p:cNvPr id="49" name="Elbow Connector 48">
+            <a:extLst>
+              <a:ext uri="{FF2B5EF4-FFF2-40B4-BE49-F238E27FC236}">
+                <a16:creationId xmlns:a16="http://schemas.microsoft.com/office/drawing/2014/main" id="{391E484D-5F63-9D37-16C6-3D13EF1B5DB6}"/>
+              </a:ext>
+            </a:extLst>
+          </p:cNvPr>
+          <p:cNvCxnSpPr>
+            <a:cxnSpLocks/>
+            <a:stCxn id="1026" idx="3"/>
+            <a:endCxn id="6" idx="0"/>
+          </p:cNvCxnSpPr>
+          <p:nvPr/>
+        </p:nvCxnSpPr>
+        <p:spPr>
+          <a:xfrm>
+            <a:off x="6203201" y="3523485"/>
+            <a:ext cx="2009587" cy="1103772"/>
+          </a:xfrm>
+          <a:prstGeom prst="bentConnector2">
+            <a:avLst/>
+          </a:prstGeom>
+          <a:ln>
+            <a:solidFill>
+              <a:schemeClr val="accent6">
+                <a:lumMod val="50000"/>
+              </a:schemeClr>
+            </a:solidFill>
+            <a:prstDash val="dash"/>
+          </a:ln>
+        </p:spPr>
+        <p:style>
+          <a:lnRef idx="1">
+            <a:schemeClr val="accent1"/>
+          </a:lnRef>
+          <a:fillRef idx="0">
+            <a:schemeClr val="accent1"/>
+          </a:fillRef>
+          <a:effectRef idx="0">
+            <a:schemeClr val="accent1"/>
+          </a:effectRef>
+          <a:fontRef idx="minor">
+            <a:schemeClr val="tx1"/>
+          </a:fontRef>
+        </p:style>
+      </p:cxnSp>
+      <p:pic>
+        <p:nvPicPr>
+          <p:cNvPr id="4" name="Picture 2">
+            <a:extLst>
+              <a:ext uri="{FF2B5EF4-FFF2-40B4-BE49-F238E27FC236}">
+                <a16:creationId xmlns:a16="http://schemas.microsoft.com/office/drawing/2014/main" id="{A3B97C6B-72CB-46E0-0439-7F48985EBDE7}"/>
+              </a:ext>
+            </a:extLst>
+          </p:cNvPr>
+          <p:cNvPicPr>
+            <a:picLocks noChangeAspect="1" noChangeArrowheads="1"/>
+          </p:cNvPicPr>
+          <p:nvPr/>
+        </p:nvPicPr>
+        <p:blipFill>
+          <a:blip r:embed="rId5">
+            <a:extLst>
+              <a:ext uri="{28A0092B-C50C-407E-A947-70E740481C1C}">
+                <a14:useLocalDpi xmlns:a14="http://schemas.microsoft.com/office/drawing/2010/main" val="0"/>
+              </a:ext>
+            </a:extLst>
+          </a:blip>
+          <a:srcRect/>
+          <a:stretch>
+            <a:fillRect/>
+          </a:stretch>
+        </p:blipFill>
+        <p:spPr bwMode="auto">
+          <a:xfrm>
+            <a:off x="7925624" y="3251645"/>
+            <a:ext cx="574327" cy="556380"/>
+          </a:xfrm>
+          <a:prstGeom prst="rect">
+            <a:avLst/>
+          </a:prstGeom>
+          <a:noFill/>
+          <a:extLst>
+            <a:ext uri="{909E8E84-426E-40DD-AFC4-6F175D3DCCD1}">
+              <a14:hiddenFill xmlns:a14="http://schemas.microsoft.com/office/drawing/2010/main">
+                <a:solidFill>
+                  <a:srgbClr val="FFFFFF"/>
+                </a:solidFill>
+              </a14:hiddenFill>
+            </a:ext>
+          </a:extLst>
+        </p:spPr>
+      </p:pic>
+      <p:sp>
+        <p:nvSpPr>
+          <p:cNvPr id="53" name="Folded Corner 52">
+            <a:extLst>
+              <a:ext uri="{FF2B5EF4-FFF2-40B4-BE49-F238E27FC236}">
+                <a16:creationId xmlns:a16="http://schemas.microsoft.com/office/drawing/2014/main" id="{D7D13126-0ED7-6D8B-D5FF-33D876E8842F}"/>
+              </a:ext>
+            </a:extLst>
+          </p:cNvPr>
+          <p:cNvSpPr/>
+          <p:nvPr/>
+        </p:nvSpPr>
+        <p:spPr>
+          <a:xfrm>
+            <a:off x="2591194" y="4122353"/>
+            <a:ext cx="667969" cy="541835"/>
+          </a:xfrm>
+          <a:prstGeom prst="foldedCorner">
+            <a:avLst/>
+          </a:prstGeom>
+          <a:solidFill>
+            <a:schemeClr val="accent4">
+              <a:lumMod val="20000"/>
+              <a:lumOff val="80000"/>
+            </a:schemeClr>
+          </a:solidFill>
+          <a:ln>
+            <a:solidFill>
+              <a:schemeClr val="accent1"/>
+            </a:solidFill>
+          </a:ln>
+        </p:spPr>
+        <p:style>
+          <a:lnRef idx="2">
+            <a:schemeClr val="accent1">
+              <a:shade val="50000"/>
+            </a:schemeClr>
+          </a:lnRef>
+          <a:fillRef idx="1">
+            <a:schemeClr val="accent1"/>
+          </a:fillRef>
+          <a:effectRef idx="0">
+            <a:schemeClr val="accent1"/>
+          </a:effectRef>
+          <a:fontRef idx="minor">
+            <a:schemeClr val="lt1"/>
+          </a:fontRef>
+        </p:style>
+        <p:txBody>
+          <a:bodyPr rtlCol="0" anchor="ctr"/>
+          <a:lstStyle/>
+          <a:p>
+            <a:pPr algn="ctr"/>
+            <a:r>
+              <a:rPr lang="en-US" sz="1000">
+                <a:solidFill>
+                  <a:schemeClr val="tx1"/>
+                </a:solidFill>
+              </a:rPr>
+              <a:t>channel config</a:t>
+            </a:r>
+          </a:p>
+        </p:txBody>
+      </p:sp>
+      <p:sp>
+        <p:nvSpPr>
+          <p:cNvPr id="1024" name="Rounded Rectangle 1023">
+            <a:extLst>
+              <a:ext uri="{FF2B5EF4-FFF2-40B4-BE49-F238E27FC236}">
+                <a16:creationId xmlns:a16="http://schemas.microsoft.com/office/drawing/2014/main" id="{42242201-2B40-BD97-18B9-E7337EE660F2}"/>
+              </a:ext>
+            </a:extLst>
+          </p:cNvPr>
+          <p:cNvSpPr/>
+          <p:nvPr/>
+        </p:nvSpPr>
+        <p:spPr>
+          <a:xfrm>
+            <a:off x="2568417" y="3357518"/>
+            <a:ext cx="1324339" cy="344658"/>
+          </a:xfrm>
+          <a:prstGeom prst="roundRect">
+            <a:avLst/>
+          </a:prstGeom>
+          <a:solidFill>
+            <a:schemeClr val="accent1">
+              <a:lumMod val="75000"/>
+            </a:schemeClr>
+          </a:solidFill>
+        </p:spPr>
+        <p:style>
+          <a:lnRef idx="2">
+            <a:schemeClr val="accent1">
+              <a:shade val="50000"/>
+            </a:schemeClr>
+          </a:lnRef>
+          <a:fillRef idx="1">
+            <a:schemeClr val="accent1"/>
+          </a:fillRef>
+          <a:effectRef idx="0">
+            <a:schemeClr val="accent1"/>
+          </a:effectRef>
+          <a:fontRef idx="minor">
+            <a:schemeClr val="lt1"/>
+          </a:fontRef>
+        </p:style>
+        <p:txBody>
+          <a:bodyPr rtlCol="0" anchor="ctr"/>
+          <a:lstStyle/>
+          <a:p>
+            <a:pPr algn="ctr"/>
+            <a:r>
+              <a:rPr lang="en-US" sz="1400"/>
+              <a:t>kubectl</a:t>
+            </a:r>
+          </a:p>
+        </p:txBody>
+      </p:sp>
+      <p:sp>
+        <p:nvSpPr>
+          <p:cNvPr id="1029" name="Rounded Rectangle 1028">
+            <a:extLst>
+              <a:ext uri="{FF2B5EF4-FFF2-40B4-BE49-F238E27FC236}">
+                <a16:creationId xmlns:a16="http://schemas.microsoft.com/office/drawing/2014/main" id="{4D7AF11C-402B-40EB-AEF7-BFF8C9C80CDC}"/>
+              </a:ext>
+            </a:extLst>
+          </p:cNvPr>
+          <p:cNvSpPr/>
+          <p:nvPr/>
+        </p:nvSpPr>
+        <p:spPr>
+          <a:xfrm>
+            <a:off x="2573867" y="4733117"/>
+            <a:ext cx="1324339" cy="344658"/>
+          </a:xfrm>
+          <a:prstGeom prst="roundRect">
+            <a:avLst/>
+          </a:prstGeom>
+          <a:solidFill>
+            <a:schemeClr val="accent1">
+              <a:lumMod val="75000"/>
+            </a:schemeClr>
+          </a:solidFill>
+        </p:spPr>
+        <p:style>
+          <a:lnRef idx="2">
+            <a:schemeClr val="accent1">
+              <a:shade val="50000"/>
+            </a:schemeClr>
+          </a:lnRef>
+          <a:fillRef idx="1">
+            <a:schemeClr val="accent1"/>
+          </a:fillRef>
+          <a:effectRef idx="0">
+            <a:schemeClr val="accent1"/>
+          </a:effectRef>
+          <a:fontRef idx="minor">
+            <a:schemeClr val="lt1"/>
+          </a:fontRef>
+        </p:style>
+        <p:txBody>
+          <a:bodyPr rtlCol="0" anchor="ctr"/>
+          <a:lstStyle/>
+          <a:p>
+            <a:pPr algn="ctr"/>
+            <a:r>
+              <a:rPr lang="en-US" sz="1400"/>
+              <a:t>Fabric CLI</a:t>
+            </a:r>
+          </a:p>
+        </p:txBody>
+      </p:sp>
+      <p:sp>
+        <p:nvSpPr>
+          <p:cNvPr id="1031" name="TextBox 1030">
+            <a:extLst>
+              <a:ext uri="{FF2B5EF4-FFF2-40B4-BE49-F238E27FC236}">
+                <a16:creationId xmlns:a16="http://schemas.microsoft.com/office/drawing/2014/main" id="{2EED9637-650B-49B4-0BB9-6857F75AA98A}"/>
+              </a:ext>
+            </a:extLst>
+          </p:cNvPr>
+          <p:cNvSpPr txBox="1"/>
+          <p:nvPr/>
+        </p:nvSpPr>
+        <p:spPr>
+          <a:xfrm>
+            <a:off x="5586174" y="5362647"/>
+            <a:ext cx="1106393" cy="307777"/>
+          </a:xfrm>
+          <a:prstGeom prst="rect">
+            <a:avLst/>
+          </a:prstGeom>
+          <a:noFill/>
+        </p:spPr>
+        <p:txBody>
+          <a:bodyPr wrap="none" rtlCol="0">
+            <a:spAutoFit/>
+          </a:bodyPr>
+          <a:lstStyle/>
+          <a:p>
+            <a:r>
+              <a:rPr lang="en-US" sz="1400"/>
+              <a:t>Fabric nodes</a:t>
+            </a:r>
+          </a:p>
+        </p:txBody>
+      </p:sp>
+      <p:sp>
+        <p:nvSpPr>
+          <p:cNvPr id="1032" name="TextBox 1031">
+            <a:extLst>
+              <a:ext uri="{FF2B5EF4-FFF2-40B4-BE49-F238E27FC236}">
+                <a16:creationId xmlns:a16="http://schemas.microsoft.com/office/drawing/2014/main" id="{B6496DB2-1B68-B1F2-0D63-5ACB7C1341E1}"/>
+              </a:ext>
+            </a:extLst>
+          </p:cNvPr>
+          <p:cNvSpPr txBox="1"/>
+          <p:nvPr/>
+        </p:nvSpPr>
+        <p:spPr>
+          <a:xfrm>
+            <a:off x="8613568" y="3163567"/>
+            <a:ext cx="723275" cy="707886"/>
+          </a:xfrm>
+          <a:prstGeom prst="rect">
+            <a:avLst/>
+          </a:prstGeom>
+          <a:noFill/>
+        </p:spPr>
+        <p:txBody>
+          <a:bodyPr wrap="none" rtlCol="0">
+            <a:spAutoFit/>
+          </a:bodyPr>
+          <a:lstStyle/>
+          <a:p>
+            <a:r>
+              <a:rPr lang="en-US" sz="1000">
+                <a:latin typeface="IBM Plex Mono" panose="020B0509050203000203" pitchFamily="49" charset="77"/>
+              </a:rPr>
+              <a:t>ca</a:t>
+            </a:r>
+          </a:p>
+          <a:p>
+            <a:r>
+              <a:rPr lang="en-US" sz="1000">
+                <a:latin typeface="IBM Plex Mono" panose="020B0509050203000203" pitchFamily="49" charset="77"/>
+              </a:rPr>
+              <a:t>peer</a:t>
+            </a:r>
+          </a:p>
+          <a:p>
+            <a:r>
+              <a:rPr lang="en-US" sz="1000">
+                <a:latin typeface="IBM Plex Mono" panose="020B0509050203000203" pitchFamily="49" charset="77"/>
+              </a:rPr>
+              <a:t>orderer</a:t>
+            </a:r>
+          </a:p>
+          <a:p>
+            <a:r>
+              <a:rPr lang="en-US" sz="1000">
+                <a:latin typeface="IBM Plex Mono" panose="020B0509050203000203" pitchFamily="49" charset="77"/>
+              </a:rPr>
+              <a:t>console</a:t>
+            </a:r>
+          </a:p>
+        </p:txBody>
+      </p:sp>
+    </p:spTree>
+    <p:extLst>
+      <p:ext uri="{BB962C8B-B14F-4D97-AF65-F5344CB8AC3E}">
+        <p14:creationId xmlns:p14="http://schemas.microsoft.com/office/powerpoint/2010/main" val="2452830205"/>
+      </p:ext>
+    </p:extLst>
+  </p:cSld>
+  <p:clrMapOvr>
+    <a:masterClrMapping/>
+  </p:clrMapOvr>
+</p:sld>
+</file>
+
 <file path=ppt/theme/theme1.xml><?xml version="1.0" encoding="utf-8"?>
 <a:theme xmlns:a="http://schemas.openxmlformats.org/drawingml/2006/main" name="Office Theme">
   <a:themeElements>

</xml_diff>

<commit_message>
Add an image and guide for CC
Signed-off-by: Josh Kneubuhl <jkneubuh@us.ibm.com>
</commit_message>
<xml_diff>
--- a/docs/images/CloudReady.pptx
+++ b/docs/images/CloudReady.pptx
@@ -10,6 +10,7 @@
     <p:sldId id="261" r:id="rId4"/>
     <p:sldId id="262" r:id="rId5"/>
     <p:sldId id="263" r:id="rId6"/>
+    <p:sldId id="264" r:id="rId7"/>
   </p:sldIdLst>
   <p:sldSz cx="12192000" cy="6858000"/>
   <p:notesSz cx="6858000" cy="9144000"/>
@@ -7133,6 +7134,1182 @@
 </p:sld>
 </file>
 
+<file path=ppt/slides/slide6.xml><?xml version="1.0" encoding="utf-8"?>
+<p:sld xmlns:a="http://schemas.openxmlformats.org/drawingml/2006/main" xmlns:r="http://schemas.openxmlformats.org/officeDocument/2006/relationships" xmlns:p="http://schemas.openxmlformats.org/presentationml/2006/main">
+  <p:cSld>
+    <p:spTree>
+      <p:nvGrpSpPr>
+        <p:cNvPr id="1" name=""/>
+        <p:cNvGrpSpPr/>
+        <p:nvPr/>
+      </p:nvGrpSpPr>
+      <p:grpSpPr>
+        <a:xfrm>
+          <a:off x="0" y="0"/>
+          <a:ext cx="0" cy="0"/>
+          <a:chOff x="0" y="0"/>
+          <a:chExt cx="0" cy="0"/>
+        </a:xfrm>
+      </p:grpSpPr>
+      <p:sp>
+        <p:nvSpPr>
+          <p:cNvPr id="62" name="Folded Corner 61">
+            <a:extLst>
+              <a:ext uri="{FF2B5EF4-FFF2-40B4-BE49-F238E27FC236}">
+                <a16:creationId xmlns:a16="http://schemas.microsoft.com/office/drawing/2014/main" id="{5E30740C-318B-BBD2-F411-837721E7A061}"/>
+              </a:ext>
+            </a:extLst>
+          </p:cNvPr>
+          <p:cNvSpPr/>
+          <p:nvPr/>
+        </p:nvSpPr>
+        <p:spPr>
+          <a:xfrm>
+            <a:off x="2319492" y="1523627"/>
+            <a:ext cx="1520270" cy="330213"/>
+          </a:xfrm>
+          <a:prstGeom prst="foldedCorner">
+            <a:avLst/>
+          </a:prstGeom>
+          <a:solidFill>
+            <a:schemeClr val="bg1">
+              <a:lumMod val="95000"/>
+            </a:schemeClr>
+          </a:solidFill>
+          <a:ln>
+            <a:solidFill>
+              <a:schemeClr val="bg1">
+                <a:lumMod val="85000"/>
+              </a:schemeClr>
+            </a:solidFill>
+          </a:ln>
+        </p:spPr>
+        <p:style>
+          <a:lnRef idx="2">
+            <a:schemeClr val="accent1">
+              <a:shade val="50000"/>
+            </a:schemeClr>
+          </a:lnRef>
+          <a:fillRef idx="1">
+            <a:schemeClr val="accent1"/>
+          </a:fillRef>
+          <a:effectRef idx="0">
+            <a:schemeClr val="accent1"/>
+          </a:effectRef>
+          <a:fontRef idx="minor">
+            <a:schemeClr val="lt1"/>
+          </a:fontRef>
+        </p:style>
+        <p:txBody>
+          <a:bodyPr rtlCol="0" anchor="ctr"/>
+          <a:lstStyle/>
+          <a:p>
+            <a:pPr algn="ctr"/>
+            <a:r>
+              <a:rPr lang="en-US" sz="1000">
+                <a:solidFill>
+                  <a:schemeClr val="bg1">
+                    <a:lumMod val="50000"/>
+                  </a:schemeClr>
+                </a:solidFill>
+                <a:latin typeface="IBM Plex Mono" panose="020B0509050203000203" pitchFamily="49" charset="77"/>
+              </a:rPr>
+              <a:t>asset-transfer.ts</a:t>
+            </a:r>
+          </a:p>
+        </p:txBody>
+      </p:sp>
+      <p:sp>
+        <p:nvSpPr>
+          <p:cNvPr id="5" name="Rounded Rectangle 4">
+            <a:extLst>
+              <a:ext uri="{FF2B5EF4-FFF2-40B4-BE49-F238E27FC236}">
+                <a16:creationId xmlns:a16="http://schemas.microsoft.com/office/drawing/2014/main" id="{13976EB2-D6C7-3AF3-0958-43EF32AFB41A}"/>
+              </a:ext>
+            </a:extLst>
+          </p:cNvPr>
+          <p:cNvSpPr/>
+          <p:nvPr/>
+        </p:nvSpPr>
+        <p:spPr>
+          <a:xfrm>
+            <a:off x="5551839" y="3110947"/>
+            <a:ext cx="4571875" cy="2653749"/>
+          </a:xfrm>
+          <a:prstGeom prst="roundRect">
+            <a:avLst/>
+          </a:prstGeom>
+          <a:solidFill>
+            <a:schemeClr val="bg1">
+              <a:lumMod val="95000"/>
+            </a:schemeClr>
+          </a:solidFill>
+          <a:ln>
+            <a:solidFill>
+              <a:schemeClr val="tx2">
+                <a:lumMod val="40000"/>
+                <a:lumOff val="60000"/>
+              </a:schemeClr>
+            </a:solidFill>
+          </a:ln>
+        </p:spPr>
+        <p:style>
+          <a:lnRef idx="2">
+            <a:schemeClr val="accent1">
+              <a:shade val="50000"/>
+            </a:schemeClr>
+          </a:lnRef>
+          <a:fillRef idx="1">
+            <a:schemeClr val="accent1"/>
+          </a:fillRef>
+          <a:effectRef idx="0">
+            <a:schemeClr val="accent1"/>
+          </a:effectRef>
+          <a:fontRef idx="minor">
+            <a:schemeClr val="lt1"/>
+          </a:fontRef>
+        </p:style>
+        <p:txBody>
+          <a:bodyPr rtlCol="0" anchor="ctr"/>
+          <a:lstStyle/>
+          <a:p>
+            <a:pPr algn="ctr"/>
+            <a:endParaRPr lang="en-US"/>
+          </a:p>
+        </p:txBody>
+      </p:sp>
+      <p:sp>
+        <p:nvSpPr>
+          <p:cNvPr id="21" name="TextBox 20">
+            <a:extLst>
+              <a:ext uri="{FF2B5EF4-FFF2-40B4-BE49-F238E27FC236}">
+                <a16:creationId xmlns:a16="http://schemas.microsoft.com/office/drawing/2014/main" id="{CC8BBE54-5321-369A-E697-C79336B5F269}"/>
+              </a:ext>
+            </a:extLst>
+          </p:cNvPr>
+          <p:cNvSpPr txBox="1"/>
+          <p:nvPr/>
+        </p:nvSpPr>
+        <p:spPr>
+          <a:xfrm>
+            <a:off x="12322435" y="3517510"/>
+            <a:ext cx="654346" cy="369332"/>
+          </a:xfrm>
+          <a:prstGeom prst="rect">
+            <a:avLst/>
+          </a:prstGeom>
+          <a:noFill/>
+        </p:spPr>
+        <p:txBody>
+          <a:bodyPr wrap="none" rtlCol="0">
+            <a:spAutoFit/>
+          </a:bodyPr>
+          <a:lstStyle/>
+          <a:p>
+            <a:r>
+              <a:rPr lang="en-US"/>
+              <a:t>KIND</a:t>
+            </a:r>
+          </a:p>
+        </p:txBody>
+      </p:sp>
+      <p:sp>
+        <p:nvSpPr>
+          <p:cNvPr id="2" name="TextBox 1">
+            <a:extLst>
+              <a:ext uri="{FF2B5EF4-FFF2-40B4-BE49-F238E27FC236}">
+                <a16:creationId xmlns:a16="http://schemas.microsoft.com/office/drawing/2014/main" id="{86F17F79-3093-C5AB-2B22-C4068E5CD791}"/>
+              </a:ext>
+            </a:extLst>
+          </p:cNvPr>
+          <p:cNvSpPr txBox="1"/>
+          <p:nvPr/>
+        </p:nvSpPr>
+        <p:spPr>
+          <a:xfrm>
+            <a:off x="198783" y="168965"/>
+            <a:ext cx="1812997" cy="369332"/>
+          </a:xfrm>
+          <a:prstGeom prst="rect">
+            <a:avLst/>
+          </a:prstGeom>
+          <a:noFill/>
+        </p:spPr>
+        <p:txBody>
+          <a:bodyPr wrap="none" rtlCol="0">
+            <a:spAutoFit/>
+          </a:bodyPr>
+          <a:lstStyle/>
+          <a:p>
+            <a:r>
+              <a:rPr lang="en-US"/>
+              <a:t>30-chaincode.md</a:t>
+            </a:r>
+          </a:p>
+        </p:txBody>
+      </p:sp>
+      <p:pic>
+        <p:nvPicPr>
+          <p:cNvPr id="17" name="Picture 8">
+            <a:extLst>
+              <a:ext uri="{FF2B5EF4-FFF2-40B4-BE49-F238E27FC236}">
+                <a16:creationId xmlns:a16="http://schemas.microsoft.com/office/drawing/2014/main" id="{22A53A60-23E1-AA24-7D1D-7F819EDBAC69}"/>
+              </a:ext>
+            </a:extLst>
+          </p:cNvPr>
+          <p:cNvPicPr>
+            <a:picLocks noChangeAspect="1" noChangeArrowheads="1"/>
+          </p:cNvPicPr>
+          <p:nvPr/>
+        </p:nvPicPr>
+        <p:blipFill>
+          <a:blip r:embed="rId2">
+            <a:extLst>
+              <a:ext uri="{28A0092B-C50C-407E-A947-70E740481C1C}">
+                <a14:useLocalDpi xmlns:a14="http://schemas.microsoft.com/office/drawing/2010/main" val="0"/>
+              </a:ext>
+            </a:extLst>
+          </a:blip>
+          <a:srcRect/>
+          <a:stretch>
+            <a:fillRect/>
+          </a:stretch>
+        </p:blipFill>
+        <p:spPr bwMode="auto">
+          <a:xfrm>
+            <a:off x="5271759" y="4596706"/>
+            <a:ext cx="574326" cy="556379"/>
+          </a:xfrm>
+          <a:prstGeom prst="rect">
+            <a:avLst/>
+          </a:prstGeom>
+          <a:noFill/>
+          <a:extLst>
+            <a:ext uri="{909E8E84-426E-40DD-AFC4-6F175D3DCCD1}">
+              <a14:hiddenFill xmlns:a14="http://schemas.microsoft.com/office/drawing/2010/main">
+                <a:solidFill>
+                  <a:srgbClr val="FFFFFF"/>
+                </a:solidFill>
+              </a14:hiddenFill>
+            </a:ext>
+          </a:extLst>
+        </p:spPr>
+      </p:pic>
+      <p:pic>
+        <p:nvPicPr>
+          <p:cNvPr id="18" name="Picture 12" descr="registry logo">
+            <a:extLst>
+              <a:ext uri="{FF2B5EF4-FFF2-40B4-BE49-F238E27FC236}">
+                <a16:creationId xmlns:a16="http://schemas.microsoft.com/office/drawing/2014/main" id="{B2FE9411-E248-E4C2-A899-058A4F8D0633}"/>
+              </a:ext>
+            </a:extLst>
+          </p:cNvPr>
+          <p:cNvPicPr>
+            <a:picLocks noChangeAspect="1" noChangeArrowheads="1"/>
+          </p:cNvPicPr>
+          <p:nvPr/>
+        </p:nvPicPr>
+        <p:blipFill>
+          <a:blip r:embed="rId3">
+            <a:extLst>
+              <a:ext uri="{28A0092B-C50C-407E-A947-70E740481C1C}">
+                <a14:useLocalDpi xmlns:a14="http://schemas.microsoft.com/office/drawing/2010/main" val="0"/>
+              </a:ext>
+            </a:extLst>
+          </a:blip>
+          <a:srcRect/>
+          <a:stretch>
+            <a:fillRect/>
+          </a:stretch>
+        </p:blipFill>
+        <p:spPr bwMode="auto">
+          <a:xfrm>
+            <a:off x="5416415" y="1708162"/>
+            <a:ext cx="999247" cy="999247"/>
+          </a:xfrm>
+          <a:prstGeom prst="rect">
+            <a:avLst/>
+          </a:prstGeom>
+          <a:noFill/>
+          <a:extLst>
+            <a:ext uri="{909E8E84-426E-40DD-AFC4-6F175D3DCCD1}">
+              <a14:hiddenFill xmlns:a14="http://schemas.microsoft.com/office/drawing/2010/main">
+                <a:solidFill>
+                  <a:srgbClr val="FFFFFF"/>
+                </a:solidFill>
+              </a14:hiddenFill>
+            </a:ext>
+          </a:extLst>
+        </p:spPr>
+      </p:pic>
+      <p:sp>
+        <p:nvSpPr>
+          <p:cNvPr id="3" name="Rounded Rectangle 2">
+            <a:extLst>
+              <a:ext uri="{FF2B5EF4-FFF2-40B4-BE49-F238E27FC236}">
+                <a16:creationId xmlns:a16="http://schemas.microsoft.com/office/drawing/2014/main" id="{88C22A4F-96BD-7D12-B6A3-E928F5D54284}"/>
+              </a:ext>
+            </a:extLst>
+          </p:cNvPr>
+          <p:cNvSpPr/>
+          <p:nvPr/>
+        </p:nvSpPr>
+        <p:spPr>
+          <a:xfrm>
+            <a:off x="2189335" y="4699320"/>
+            <a:ext cx="1702676" cy="344658"/>
+          </a:xfrm>
+          <a:prstGeom prst="roundRect">
+            <a:avLst/>
+          </a:prstGeom>
+          <a:solidFill>
+            <a:schemeClr val="bg1">
+              <a:lumMod val="95000"/>
+            </a:schemeClr>
+          </a:solidFill>
+          <a:ln>
+            <a:solidFill>
+              <a:schemeClr val="bg1">
+                <a:lumMod val="85000"/>
+              </a:schemeClr>
+            </a:solidFill>
+          </a:ln>
+        </p:spPr>
+        <p:style>
+          <a:lnRef idx="2">
+            <a:schemeClr val="accent1">
+              <a:shade val="50000"/>
+            </a:schemeClr>
+          </a:lnRef>
+          <a:fillRef idx="1">
+            <a:schemeClr val="accent1"/>
+          </a:fillRef>
+          <a:effectRef idx="0">
+            <a:schemeClr val="accent1"/>
+          </a:effectRef>
+          <a:fontRef idx="minor">
+            <a:schemeClr val="lt1"/>
+          </a:fontRef>
+        </p:style>
+        <p:txBody>
+          <a:bodyPr rtlCol="0" anchor="ctr"/>
+          <a:lstStyle/>
+          <a:p>
+            <a:pPr algn="ctr"/>
+            <a:r>
+              <a:rPr lang="en-US" sz="1400">
+                <a:solidFill>
+                  <a:schemeClr val="accent1">
+                    <a:lumMod val="75000"/>
+                  </a:schemeClr>
+                </a:solidFill>
+              </a:rPr>
+              <a:t>peer CLI</a:t>
+            </a:r>
+          </a:p>
+        </p:txBody>
+      </p:sp>
+      <p:sp>
+        <p:nvSpPr>
+          <p:cNvPr id="7" name="Rounded Rectangle 6">
+            <a:extLst>
+              <a:ext uri="{FF2B5EF4-FFF2-40B4-BE49-F238E27FC236}">
+                <a16:creationId xmlns:a16="http://schemas.microsoft.com/office/drawing/2014/main" id="{16C8FF95-190E-2499-7979-BFFADC3A46CF}"/>
+              </a:ext>
+            </a:extLst>
+          </p:cNvPr>
+          <p:cNvSpPr/>
+          <p:nvPr/>
+        </p:nvSpPr>
+        <p:spPr>
+          <a:xfrm>
+            <a:off x="2195530" y="3663523"/>
+            <a:ext cx="1702676" cy="904654"/>
+          </a:xfrm>
+          <a:prstGeom prst="roundRect">
+            <a:avLst/>
+          </a:prstGeom>
+          <a:solidFill>
+            <a:schemeClr val="accent4">
+              <a:lumMod val="20000"/>
+              <a:lumOff val="80000"/>
+            </a:schemeClr>
+          </a:solidFill>
+          <a:ln>
+            <a:solidFill>
+              <a:schemeClr val="bg1">
+                <a:lumMod val="85000"/>
+              </a:schemeClr>
+            </a:solidFill>
+          </a:ln>
+        </p:spPr>
+        <p:style>
+          <a:lnRef idx="2">
+            <a:schemeClr val="accent1">
+              <a:shade val="50000"/>
+            </a:schemeClr>
+          </a:lnRef>
+          <a:fillRef idx="1">
+            <a:schemeClr val="accent1"/>
+          </a:fillRef>
+          <a:effectRef idx="0">
+            <a:schemeClr val="accent1"/>
+          </a:effectRef>
+          <a:fontRef idx="minor">
+            <a:schemeClr val="lt1"/>
+          </a:fontRef>
+        </p:style>
+        <p:txBody>
+          <a:bodyPr rtlCol="0" anchor="ctr"/>
+          <a:lstStyle/>
+          <a:p>
+            <a:pPr algn="ctr"/>
+            <a:r>
+              <a:rPr lang="en-US">
+                <a:solidFill>
+                  <a:schemeClr val="accent1">
+                    <a:lumMod val="75000"/>
+                  </a:schemeClr>
+                </a:solidFill>
+              </a:rPr>
+              <a:t>CC package</a:t>
+            </a:r>
+          </a:p>
+        </p:txBody>
+      </p:sp>
+      <p:sp>
+        <p:nvSpPr>
+          <p:cNvPr id="9" name="TextBox 8">
+            <a:extLst>
+              <a:ext uri="{FF2B5EF4-FFF2-40B4-BE49-F238E27FC236}">
+                <a16:creationId xmlns:a16="http://schemas.microsoft.com/office/drawing/2014/main" id="{8057F6D9-5430-9D5A-D7AE-79003976A12B}"/>
+              </a:ext>
+            </a:extLst>
+          </p:cNvPr>
+          <p:cNvSpPr txBox="1"/>
+          <p:nvPr/>
+        </p:nvSpPr>
+        <p:spPr>
+          <a:xfrm>
+            <a:off x="2332787" y="4293238"/>
+            <a:ext cx="1415772" cy="246221"/>
+          </a:xfrm>
+          <a:prstGeom prst="rect">
+            <a:avLst/>
+          </a:prstGeom>
+          <a:noFill/>
+        </p:spPr>
+        <p:txBody>
+          <a:bodyPr wrap="none" rtlCol="0">
+            <a:spAutoFit/>
+          </a:bodyPr>
+          <a:lstStyle/>
+          <a:p>
+            <a:r>
+              <a:rPr lang="en-US" sz="1000">
+                <a:latin typeface="IBM Plex Mono" panose="020B0509050203000203" pitchFamily="49" charset="77"/>
+              </a:rPr>
+              <a:t>image@sha256:abc</a:t>
+            </a:r>
+          </a:p>
+        </p:txBody>
+      </p:sp>
+      <p:sp>
+        <p:nvSpPr>
+          <p:cNvPr id="10" name="Rounded Rectangle 9">
+            <a:extLst>
+              <a:ext uri="{FF2B5EF4-FFF2-40B4-BE49-F238E27FC236}">
+                <a16:creationId xmlns:a16="http://schemas.microsoft.com/office/drawing/2014/main" id="{9D9CC085-2F57-0364-47FD-2D11360355FA}"/>
+              </a:ext>
+            </a:extLst>
+          </p:cNvPr>
+          <p:cNvSpPr/>
+          <p:nvPr/>
+        </p:nvSpPr>
+        <p:spPr>
+          <a:xfrm>
+            <a:off x="2228289" y="1755458"/>
+            <a:ext cx="1702676" cy="904654"/>
+          </a:xfrm>
+          <a:prstGeom prst="roundRect">
+            <a:avLst/>
+          </a:prstGeom>
+          <a:solidFill>
+            <a:schemeClr val="accent1">
+              <a:lumMod val="20000"/>
+              <a:lumOff val="80000"/>
+            </a:schemeClr>
+          </a:solidFill>
+          <a:ln>
+            <a:solidFill>
+              <a:schemeClr val="bg1">
+                <a:lumMod val="85000"/>
+              </a:schemeClr>
+            </a:solidFill>
+          </a:ln>
+        </p:spPr>
+        <p:style>
+          <a:lnRef idx="2">
+            <a:schemeClr val="accent1">
+              <a:shade val="50000"/>
+            </a:schemeClr>
+          </a:lnRef>
+          <a:fillRef idx="1">
+            <a:schemeClr val="accent1"/>
+          </a:fillRef>
+          <a:effectRef idx="0">
+            <a:schemeClr val="accent1"/>
+          </a:effectRef>
+          <a:fontRef idx="minor">
+            <a:schemeClr val="lt1"/>
+          </a:fontRef>
+        </p:style>
+        <p:txBody>
+          <a:bodyPr rtlCol="0" anchor="ctr"/>
+          <a:lstStyle/>
+          <a:p>
+            <a:pPr algn="ctr"/>
+            <a:r>
+              <a:rPr lang="en-US" b="1">
+                <a:solidFill>
+                  <a:schemeClr val="accent1">
+                    <a:lumMod val="75000"/>
+                  </a:schemeClr>
+                </a:solidFill>
+              </a:rPr>
+              <a:t>CC image</a:t>
+            </a:r>
+          </a:p>
+        </p:txBody>
+      </p:sp>
+      <p:sp>
+        <p:nvSpPr>
+          <p:cNvPr id="11" name="TextBox 10">
+            <a:extLst>
+              <a:ext uri="{FF2B5EF4-FFF2-40B4-BE49-F238E27FC236}">
+                <a16:creationId xmlns:a16="http://schemas.microsoft.com/office/drawing/2014/main" id="{10A933CE-979F-12F4-A50C-CDB64608193C}"/>
+              </a:ext>
+            </a:extLst>
+          </p:cNvPr>
+          <p:cNvSpPr txBox="1"/>
+          <p:nvPr/>
+        </p:nvSpPr>
+        <p:spPr>
+          <a:xfrm>
+            <a:off x="2371741" y="2381450"/>
+            <a:ext cx="1415772" cy="246221"/>
+          </a:xfrm>
+          <a:prstGeom prst="rect">
+            <a:avLst/>
+          </a:prstGeom>
+          <a:noFill/>
+        </p:spPr>
+        <p:txBody>
+          <a:bodyPr wrap="none" rtlCol="0">
+            <a:spAutoFit/>
+          </a:bodyPr>
+          <a:lstStyle/>
+          <a:p>
+            <a:r>
+              <a:rPr lang="en-US" sz="1000">
+                <a:latin typeface="IBM Plex Mono" panose="020B0509050203000203" pitchFamily="49" charset="77"/>
+              </a:rPr>
+              <a:t>image@sha256:abc</a:t>
+            </a:r>
+          </a:p>
+        </p:txBody>
+      </p:sp>
+      <p:sp>
+        <p:nvSpPr>
+          <p:cNvPr id="13" name="Rounded Rectangle 12">
+            <a:extLst>
+              <a:ext uri="{FF2B5EF4-FFF2-40B4-BE49-F238E27FC236}">
+                <a16:creationId xmlns:a16="http://schemas.microsoft.com/office/drawing/2014/main" id="{B3AB8FD0-B844-4EA5-2A56-B1805B13A34D}"/>
+              </a:ext>
+            </a:extLst>
+          </p:cNvPr>
+          <p:cNvSpPr/>
+          <p:nvPr/>
+        </p:nvSpPr>
+        <p:spPr>
+          <a:xfrm>
+            <a:off x="2228289" y="2791255"/>
+            <a:ext cx="1702676" cy="344658"/>
+          </a:xfrm>
+          <a:prstGeom prst="roundRect">
+            <a:avLst/>
+          </a:prstGeom>
+          <a:solidFill>
+            <a:schemeClr val="bg1">
+              <a:lumMod val="95000"/>
+            </a:schemeClr>
+          </a:solidFill>
+          <a:ln>
+            <a:solidFill>
+              <a:schemeClr val="bg1">
+                <a:lumMod val="85000"/>
+              </a:schemeClr>
+            </a:solidFill>
+          </a:ln>
+        </p:spPr>
+        <p:style>
+          <a:lnRef idx="2">
+            <a:schemeClr val="accent1">
+              <a:shade val="50000"/>
+            </a:schemeClr>
+          </a:lnRef>
+          <a:fillRef idx="1">
+            <a:schemeClr val="accent1"/>
+          </a:fillRef>
+          <a:effectRef idx="0">
+            <a:schemeClr val="accent1"/>
+          </a:effectRef>
+          <a:fontRef idx="minor">
+            <a:schemeClr val="lt1"/>
+          </a:fontRef>
+        </p:style>
+        <p:txBody>
+          <a:bodyPr rtlCol="0" anchor="ctr"/>
+          <a:lstStyle/>
+          <a:p>
+            <a:pPr algn="ctr"/>
+            <a:r>
+              <a:rPr lang="en-US" sz="1400">
+                <a:solidFill>
+                  <a:schemeClr val="accent1">
+                    <a:lumMod val="75000"/>
+                  </a:schemeClr>
+                </a:solidFill>
+              </a:rPr>
+              <a:t>docker CLI</a:t>
+            </a:r>
+          </a:p>
+        </p:txBody>
+      </p:sp>
+      <p:sp>
+        <p:nvSpPr>
+          <p:cNvPr id="14" name="Rounded Rectangle 13">
+            <a:extLst>
+              <a:ext uri="{FF2B5EF4-FFF2-40B4-BE49-F238E27FC236}">
+                <a16:creationId xmlns:a16="http://schemas.microsoft.com/office/drawing/2014/main" id="{41988820-B271-BC31-1E58-0A57B384209D}"/>
+              </a:ext>
+            </a:extLst>
+          </p:cNvPr>
+          <p:cNvSpPr/>
+          <p:nvPr/>
+        </p:nvSpPr>
+        <p:spPr>
+          <a:xfrm>
+            <a:off x="7857963" y="4593459"/>
+            <a:ext cx="1789044" cy="556379"/>
+          </a:xfrm>
+          <a:prstGeom prst="roundRect">
+            <a:avLst/>
+          </a:prstGeom>
+          <a:solidFill>
+            <a:schemeClr val="bg1">
+              <a:lumMod val="95000"/>
+            </a:schemeClr>
+          </a:solidFill>
+          <a:ln>
+            <a:solidFill>
+              <a:schemeClr val="bg1">
+                <a:lumMod val="85000"/>
+              </a:schemeClr>
+            </a:solidFill>
+          </a:ln>
+        </p:spPr>
+        <p:style>
+          <a:lnRef idx="2">
+            <a:schemeClr val="accent1">
+              <a:shade val="50000"/>
+            </a:schemeClr>
+          </a:lnRef>
+          <a:fillRef idx="1">
+            <a:schemeClr val="accent1"/>
+          </a:fillRef>
+          <a:effectRef idx="0">
+            <a:schemeClr val="accent1"/>
+          </a:effectRef>
+          <a:fontRef idx="minor">
+            <a:schemeClr val="lt1"/>
+          </a:fontRef>
+        </p:style>
+        <p:txBody>
+          <a:bodyPr rtlCol="0" anchor="ctr"/>
+          <a:lstStyle/>
+          <a:p>
+            <a:pPr algn="ctr"/>
+            <a:r>
+              <a:rPr lang="en-US" sz="1600">
+                <a:solidFill>
+                  <a:schemeClr val="tx2">
+                    <a:lumMod val="60000"/>
+                    <a:lumOff val="40000"/>
+                  </a:schemeClr>
+                </a:solidFill>
+              </a:rPr>
+              <a:t>fabric-operator</a:t>
+            </a:r>
+          </a:p>
+        </p:txBody>
+      </p:sp>
+      <p:pic>
+        <p:nvPicPr>
+          <p:cNvPr id="20" name="Picture 4">
+            <a:extLst>
+              <a:ext uri="{FF2B5EF4-FFF2-40B4-BE49-F238E27FC236}">
+                <a16:creationId xmlns:a16="http://schemas.microsoft.com/office/drawing/2014/main" id="{3AF04FF4-E856-9CFC-2669-B4E036F8ED64}"/>
+              </a:ext>
+            </a:extLst>
+          </p:cNvPr>
+          <p:cNvPicPr>
+            <a:picLocks noChangeAspect="1" noChangeArrowheads="1"/>
+          </p:cNvPicPr>
+          <p:nvPr/>
+        </p:nvPicPr>
+        <p:blipFill>
+          <a:blip r:embed="rId4">
+            <a:extLst>
+              <a:ext uri="{28A0092B-C50C-407E-A947-70E740481C1C}">
+                <a14:useLocalDpi xmlns:a14="http://schemas.microsoft.com/office/drawing/2010/main" val="0"/>
+              </a:ext>
+            </a:extLst>
+          </a:blip>
+          <a:srcRect/>
+          <a:stretch>
+            <a:fillRect/>
+          </a:stretch>
+        </p:blipFill>
+        <p:spPr bwMode="auto">
+          <a:xfrm>
+            <a:off x="6564580" y="4596706"/>
+            <a:ext cx="574888" cy="556923"/>
+          </a:xfrm>
+          <a:prstGeom prst="rect">
+            <a:avLst/>
+          </a:prstGeom>
+          <a:noFill/>
+          <a:extLst>
+            <a:ext uri="{909E8E84-426E-40DD-AFC4-6F175D3DCCD1}">
+              <a14:hiddenFill xmlns:a14="http://schemas.microsoft.com/office/drawing/2010/main">
+                <a:solidFill>
+                  <a:srgbClr val="FFFFFF"/>
+                </a:solidFill>
+              </a14:hiddenFill>
+            </a:ext>
+          </a:extLst>
+        </p:spPr>
+      </p:pic>
+      <p:cxnSp>
+        <p:nvCxnSpPr>
+          <p:cNvPr id="23" name="Elbow Connector 22">
+            <a:extLst>
+              <a:ext uri="{FF2B5EF4-FFF2-40B4-BE49-F238E27FC236}">
+                <a16:creationId xmlns:a16="http://schemas.microsoft.com/office/drawing/2014/main" id="{2952F4B8-38B2-C9DC-5446-227A5D8D3A6A}"/>
+              </a:ext>
+            </a:extLst>
+          </p:cNvPr>
+          <p:cNvCxnSpPr>
+            <a:cxnSpLocks/>
+            <a:stCxn id="17" idx="3"/>
+            <a:endCxn id="20" idx="1"/>
+          </p:cNvCxnSpPr>
+          <p:nvPr/>
+        </p:nvCxnSpPr>
+        <p:spPr>
+          <a:xfrm>
+            <a:off x="5846085" y="4874896"/>
+            <a:ext cx="718495" cy="272"/>
+          </a:xfrm>
+          <a:prstGeom prst="bentConnector3">
+            <a:avLst>
+              <a:gd name="adj1" fmla="val 50000"/>
+            </a:avLst>
+          </a:prstGeom>
+          <a:ln>
+            <a:prstDash val="dash"/>
+          </a:ln>
+        </p:spPr>
+        <p:style>
+          <a:lnRef idx="1">
+            <a:schemeClr val="accent6"/>
+          </a:lnRef>
+          <a:fillRef idx="0">
+            <a:schemeClr val="accent6"/>
+          </a:fillRef>
+          <a:effectRef idx="0">
+            <a:schemeClr val="accent6"/>
+          </a:effectRef>
+          <a:fontRef idx="minor">
+            <a:schemeClr val="tx1"/>
+          </a:fontRef>
+        </p:style>
+      </p:cxnSp>
+      <p:sp>
+        <p:nvSpPr>
+          <p:cNvPr id="25" name="TextBox 24">
+            <a:extLst>
+              <a:ext uri="{FF2B5EF4-FFF2-40B4-BE49-F238E27FC236}">
+                <a16:creationId xmlns:a16="http://schemas.microsoft.com/office/drawing/2014/main" id="{BDB9DEB3-744C-1600-E792-077278F7FA26}"/>
+              </a:ext>
+            </a:extLst>
+          </p:cNvPr>
+          <p:cNvSpPr txBox="1"/>
+          <p:nvPr/>
+        </p:nvSpPr>
+        <p:spPr>
+          <a:xfrm>
+            <a:off x="6394206" y="5277930"/>
+            <a:ext cx="915635" cy="307777"/>
+          </a:xfrm>
+          <a:prstGeom prst="rect">
+            <a:avLst/>
+          </a:prstGeom>
+          <a:noFill/>
+        </p:spPr>
+        <p:txBody>
+          <a:bodyPr wrap="none" rtlCol="0">
+            <a:spAutoFit/>
+          </a:bodyPr>
+          <a:lstStyle/>
+          <a:p>
+            <a:r>
+              <a:rPr lang="en-US" sz="1400"/>
+              <a:t>peer pods</a:t>
+            </a:r>
+          </a:p>
+        </p:txBody>
+      </p:sp>
+      <p:sp>
+        <p:nvSpPr>
+          <p:cNvPr id="26" name="Rounded Rectangle 25">
+            <a:extLst>
+              <a:ext uri="{FF2B5EF4-FFF2-40B4-BE49-F238E27FC236}">
+                <a16:creationId xmlns:a16="http://schemas.microsoft.com/office/drawing/2014/main" id="{9E0D9FBC-FB0D-3BB7-445C-693D38AE0795}"/>
+              </a:ext>
+            </a:extLst>
+          </p:cNvPr>
+          <p:cNvSpPr/>
+          <p:nvPr/>
+        </p:nvSpPr>
+        <p:spPr>
+          <a:xfrm>
+            <a:off x="7857963" y="3663523"/>
+            <a:ext cx="1789044" cy="556379"/>
+          </a:xfrm>
+          <a:prstGeom prst="roundRect">
+            <a:avLst/>
+          </a:prstGeom>
+          <a:solidFill>
+            <a:srgbClr val="7030A0"/>
+          </a:solidFill>
+        </p:spPr>
+        <p:style>
+          <a:lnRef idx="2">
+            <a:schemeClr val="accent1">
+              <a:shade val="50000"/>
+            </a:schemeClr>
+          </a:lnRef>
+          <a:fillRef idx="1">
+            <a:schemeClr val="accent1"/>
+          </a:fillRef>
+          <a:effectRef idx="0">
+            <a:schemeClr val="accent1"/>
+          </a:effectRef>
+          <a:fontRef idx="minor">
+            <a:schemeClr val="lt1"/>
+          </a:fontRef>
+        </p:style>
+        <p:txBody>
+          <a:bodyPr rtlCol="0" anchor="ctr"/>
+          <a:lstStyle/>
+          <a:p>
+            <a:pPr algn="ctr"/>
+            <a:r>
+              <a:rPr lang="en-US" sz="1600"/>
+              <a:t>fabric-k8s-builder</a:t>
+            </a:r>
+          </a:p>
+        </p:txBody>
+      </p:sp>
+      <p:sp>
+        <p:nvSpPr>
+          <p:cNvPr id="36" name="TextBox 35">
+            <a:extLst>
+              <a:ext uri="{FF2B5EF4-FFF2-40B4-BE49-F238E27FC236}">
+                <a16:creationId xmlns:a16="http://schemas.microsoft.com/office/drawing/2014/main" id="{4A2D68C0-98EC-3910-D501-D0C18277D31D}"/>
+              </a:ext>
+            </a:extLst>
+          </p:cNvPr>
+          <p:cNvSpPr txBox="1"/>
+          <p:nvPr/>
+        </p:nvSpPr>
+        <p:spPr>
+          <a:xfrm>
+            <a:off x="6067194" y="3305889"/>
+            <a:ext cx="1569660" cy="246221"/>
+          </a:xfrm>
+          <a:prstGeom prst="rect">
+            <a:avLst/>
+          </a:prstGeom>
+          <a:noFill/>
+        </p:spPr>
+        <p:txBody>
+          <a:bodyPr wrap="none" rtlCol="0">
+            <a:spAutoFit/>
+          </a:bodyPr>
+          <a:lstStyle/>
+          <a:p>
+            <a:pPr algn="ctr"/>
+            <a:r>
+              <a:rPr lang="en-US" sz="1000">
+                <a:latin typeface="IBM Plex Mono" panose="020B0509050203000203" pitchFamily="49" charset="77"/>
+              </a:rPr>
+              <a:t>image@sha256:abc..</a:t>
+            </a:r>
+          </a:p>
+        </p:txBody>
+      </p:sp>
+      <p:cxnSp>
+        <p:nvCxnSpPr>
+          <p:cNvPr id="38" name="Elbow Connector 37">
+            <a:extLst>
+              <a:ext uri="{FF2B5EF4-FFF2-40B4-BE49-F238E27FC236}">
+                <a16:creationId xmlns:a16="http://schemas.microsoft.com/office/drawing/2014/main" id="{CC15ABDA-066F-F3F0-000C-019F463E7E33}"/>
+              </a:ext>
+            </a:extLst>
+          </p:cNvPr>
+          <p:cNvCxnSpPr>
+            <a:cxnSpLocks/>
+            <a:stCxn id="18" idx="3"/>
+            <a:endCxn id="5" idx="0"/>
+          </p:cNvCxnSpPr>
+          <p:nvPr/>
+        </p:nvCxnSpPr>
+        <p:spPr>
+          <a:xfrm>
+            <a:off x="6415662" y="2207786"/>
+            <a:ext cx="1422115" cy="903161"/>
+          </a:xfrm>
+          <a:prstGeom prst="bentConnector2">
+            <a:avLst/>
+          </a:prstGeom>
+          <a:ln>
+            <a:headEnd type="none" w="med" len="med"/>
+            <a:tailEnd type="none" w="med" len="med"/>
+          </a:ln>
+        </p:spPr>
+        <p:style>
+          <a:lnRef idx="1">
+            <a:schemeClr val="accent2"/>
+          </a:lnRef>
+          <a:fillRef idx="0">
+            <a:schemeClr val="accent2"/>
+          </a:fillRef>
+          <a:effectRef idx="0">
+            <a:schemeClr val="accent2"/>
+          </a:effectRef>
+          <a:fontRef idx="minor">
+            <a:schemeClr val="tx1"/>
+          </a:fontRef>
+        </p:style>
+      </p:cxnSp>
+      <p:cxnSp>
+        <p:nvCxnSpPr>
+          <p:cNvPr id="39" name="Elbow Connector 38">
+            <a:extLst>
+              <a:ext uri="{FF2B5EF4-FFF2-40B4-BE49-F238E27FC236}">
+                <a16:creationId xmlns:a16="http://schemas.microsoft.com/office/drawing/2014/main" id="{BEB33AEE-00F4-20BA-F20A-C01950779C15}"/>
+              </a:ext>
+            </a:extLst>
+          </p:cNvPr>
+          <p:cNvCxnSpPr>
+            <a:cxnSpLocks/>
+            <a:stCxn id="10" idx="3"/>
+            <a:endCxn id="18" idx="1"/>
+          </p:cNvCxnSpPr>
+          <p:nvPr/>
+        </p:nvCxnSpPr>
+        <p:spPr>
+          <a:xfrm>
+            <a:off x="3930965" y="2207785"/>
+            <a:ext cx="1485450" cy="1"/>
+          </a:xfrm>
+          <a:prstGeom prst="bentConnector3">
+            <a:avLst>
+              <a:gd name="adj1" fmla="val 50000"/>
+            </a:avLst>
+          </a:prstGeom>
+          <a:ln>
+            <a:tailEnd type="triangle"/>
+          </a:ln>
+        </p:spPr>
+        <p:style>
+          <a:lnRef idx="1">
+            <a:schemeClr val="accent2"/>
+          </a:lnRef>
+          <a:fillRef idx="0">
+            <a:schemeClr val="accent2"/>
+          </a:fillRef>
+          <a:effectRef idx="0">
+            <a:schemeClr val="accent2"/>
+          </a:effectRef>
+          <a:fontRef idx="minor">
+            <a:schemeClr val="tx1"/>
+          </a:fontRef>
+        </p:style>
+      </p:cxnSp>
+      <p:cxnSp>
+        <p:nvCxnSpPr>
+          <p:cNvPr id="45" name="Elbow Connector 44">
+            <a:extLst>
+              <a:ext uri="{FF2B5EF4-FFF2-40B4-BE49-F238E27FC236}">
+                <a16:creationId xmlns:a16="http://schemas.microsoft.com/office/drawing/2014/main" id="{EE6BB463-0C06-E38B-8E69-A479A87E21F1}"/>
+              </a:ext>
+            </a:extLst>
+          </p:cNvPr>
+          <p:cNvCxnSpPr>
+            <a:cxnSpLocks/>
+            <a:stCxn id="3" idx="3"/>
+            <a:endCxn id="17" idx="1"/>
+          </p:cNvCxnSpPr>
+          <p:nvPr/>
+        </p:nvCxnSpPr>
+        <p:spPr>
+          <a:xfrm>
+            <a:off x="3892011" y="4871649"/>
+            <a:ext cx="1379748" cy="3247"/>
+          </a:xfrm>
+          <a:prstGeom prst="bentConnector3">
+            <a:avLst>
+              <a:gd name="adj1" fmla="val 50000"/>
+            </a:avLst>
+          </a:prstGeom>
+          <a:ln>
+            <a:tailEnd type="triangle"/>
+          </a:ln>
+        </p:spPr>
+        <p:style>
+          <a:lnRef idx="1">
+            <a:schemeClr val="accent2"/>
+          </a:lnRef>
+          <a:fillRef idx="0">
+            <a:schemeClr val="accent2"/>
+          </a:fillRef>
+          <a:effectRef idx="0">
+            <a:schemeClr val="accent2"/>
+          </a:effectRef>
+          <a:fontRef idx="minor">
+            <a:schemeClr val="tx1"/>
+          </a:fontRef>
+        </p:style>
+      </p:cxnSp>
+      <p:cxnSp>
+        <p:nvCxnSpPr>
+          <p:cNvPr id="53" name="Elbow Connector 52">
+            <a:extLst>
+              <a:ext uri="{FF2B5EF4-FFF2-40B4-BE49-F238E27FC236}">
+                <a16:creationId xmlns:a16="http://schemas.microsoft.com/office/drawing/2014/main" id="{D271B6DF-EB41-54E4-08F8-BC1A392E73D4}"/>
+              </a:ext>
+            </a:extLst>
+          </p:cNvPr>
+          <p:cNvCxnSpPr>
+            <a:cxnSpLocks/>
+            <a:stCxn id="20" idx="0"/>
+            <a:endCxn id="57" idx="2"/>
+          </p:cNvCxnSpPr>
+          <p:nvPr/>
+        </p:nvCxnSpPr>
+        <p:spPr>
+          <a:xfrm rot="5400000" flipH="1" flipV="1">
+            <a:off x="6666621" y="4411303"/>
+            <a:ext cx="370806" cy="12700"/>
+          </a:xfrm>
+          <a:prstGeom prst="bentConnector3">
+            <a:avLst>
+              <a:gd name="adj1" fmla="val 50000"/>
+            </a:avLst>
+          </a:prstGeom>
+          <a:ln>
+            <a:prstDash val="dash"/>
+          </a:ln>
+        </p:spPr>
+        <p:style>
+          <a:lnRef idx="1">
+            <a:schemeClr val="accent6"/>
+          </a:lnRef>
+          <a:fillRef idx="0">
+            <a:schemeClr val="accent6"/>
+          </a:fillRef>
+          <a:effectRef idx="0">
+            <a:schemeClr val="accent6"/>
+          </a:effectRef>
+          <a:fontRef idx="minor">
+            <a:schemeClr val="tx1"/>
+          </a:fontRef>
+        </p:style>
+      </p:cxnSp>
+      <p:pic>
+        <p:nvPicPr>
+          <p:cNvPr id="57" name="Picture 4">
+            <a:extLst>
+              <a:ext uri="{FF2B5EF4-FFF2-40B4-BE49-F238E27FC236}">
+                <a16:creationId xmlns:a16="http://schemas.microsoft.com/office/drawing/2014/main" id="{63480EB3-6C2D-E746-BF95-DBE0C671EF4D}"/>
+              </a:ext>
+            </a:extLst>
+          </p:cNvPr>
+          <p:cNvPicPr>
+            <a:picLocks noChangeAspect="1" noChangeArrowheads="1"/>
+          </p:cNvPicPr>
+          <p:nvPr/>
+        </p:nvPicPr>
+        <p:blipFill>
+          <a:blip r:embed="rId4">
+            <a:extLst>
+              <a:ext uri="{28A0092B-C50C-407E-A947-70E740481C1C}">
+                <a14:useLocalDpi xmlns:a14="http://schemas.microsoft.com/office/drawing/2010/main" val="0"/>
+              </a:ext>
+            </a:extLst>
+          </a:blip>
+          <a:srcRect/>
+          <a:stretch>
+            <a:fillRect/>
+          </a:stretch>
+        </p:blipFill>
+        <p:spPr bwMode="auto">
+          <a:xfrm>
+            <a:off x="6564580" y="3668977"/>
+            <a:ext cx="574888" cy="556923"/>
+          </a:xfrm>
+          <a:prstGeom prst="rect">
+            <a:avLst/>
+          </a:prstGeom>
+          <a:noFill/>
+          <a:extLst>
+            <a:ext uri="{909E8E84-426E-40DD-AFC4-6F175D3DCCD1}">
+              <a14:hiddenFill xmlns:a14="http://schemas.microsoft.com/office/drawing/2010/main">
+                <a:solidFill>
+                  <a:srgbClr val="FFFFFF"/>
+                </a:solidFill>
+              </a14:hiddenFill>
+            </a:ext>
+          </a:extLst>
+        </p:spPr>
+      </p:pic>
+    </p:spTree>
+    <p:extLst>
+      <p:ext uri="{BB962C8B-B14F-4D97-AF65-F5344CB8AC3E}">
+        <p14:creationId xmlns:p14="http://schemas.microsoft.com/office/powerpoint/2010/main" val="3488265271"/>
+      </p:ext>
+    </p:extLst>
+  </p:cSld>
+  <p:clrMapOvr>
+    <a:masterClrMapping/>
+  </p:clrMapOvr>
+</p:sld>
+</file>
+
 <file path=ppt/theme/theme1.xml><?xml version="1.0" encoding="utf-8"?>
 <a:theme xmlns:a="http://schemas.openxmlformats.org/drawingml/2006/main" name="Office Theme">
   <a:themeElements>

</xml_diff>

<commit_message>
Oops forgot to ^s save the ppt with the latest figures
Signed-off-by: Josh Kneubuhl <jkneubuh@us.ibm.com>
</commit_message>
<xml_diff>
--- a/docs/images/CloudReady.pptx
+++ b/docs/images/CloudReady.pptx
@@ -11,6 +11,7 @@
     <p:sldId id="262" r:id="rId5"/>
     <p:sldId id="263" r:id="rId6"/>
     <p:sldId id="264" r:id="rId7"/>
+    <p:sldId id="265" r:id="rId8"/>
   </p:sldIdLst>
   <p:sldSz cx="12192000" cy="6858000"/>
   <p:notesSz cx="6858000" cy="9144000"/>
@@ -8310,6 +8311,1179 @@
 </p:sld>
 </file>
 
+<file path=ppt/slides/slide7.xml><?xml version="1.0" encoding="utf-8"?>
+<p:sld xmlns:a="http://schemas.openxmlformats.org/drawingml/2006/main" xmlns:r="http://schemas.openxmlformats.org/officeDocument/2006/relationships" xmlns:p="http://schemas.openxmlformats.org/presentationml/2006/main">
+  <p:cSld>
+    <p:spTree>
+      <p:nvGrpSpPr>
+        <p:cNvPr id="1" name=""/>
+        <p:cNvGrpSpPr/>
+        <p:nvPr/>
+      </p:nvGrpSpPr>
+      <p:grpSpPr>
+        <a:xfrm>
+          <a:off x="0" y="0"/>
+          <a:ext cx="0" cy="0"/>
+          <a:chOff x="0" y="0"/>
+          <a:chExt cx="0" cy="0"/>
+        </a:xfrm>
+      </p:grpSpPr>
+      <p:sp>
+        <p:nvSpPr>
+          <p:cNvPr id="27" name="Folded Corner 26">
+            <a:extLst>
+              <a:ext uri="{FF2B5EF4-FFF2-40B4-BE49-F238E27FC236}">
+                <a16:creationId xmlns:a16="http://schemas.microsoft.com/office/drawing/2014/main" id="{3AEA119C-F148-7AD9-87FE-51BDF481CD9B}"/>
+              </a:ext>
+            </a:extLst>
+          </p:cNvPr>
+          <p:cNvSpPr/>
+          <p:nvPr/>
+        </p:nvSpPr>
+        <p:spPr>
+          <a:xfrm>
+            <a:off x="2502608" y="3752430"/>
+            <a:ext cx="1520270" cy="330213"/>
+          </a:xfrm>
+          <a:prstGeom prst="foldedCorner">
+            <a:avLst/>
+          </a:prstGeom>
+          <a:solidFill>
+            <a:schemeClr val="bg1"/>
+          </a:solidFill>
+          <a:ln>
+            <a:solidFill>
+              <a:schemeClr val="bg1">
+                <a:lumMod val="85000"/>
+              </a:schemeClr>
+            </a:solidFill>
+          </a:ln>
+        </p:spPr>
+        <p:style>
+          <a:lnRef idx="2">
+            <a:schemeClr val="accent1">
+              <a:shade val="50000"/>
+            </a:schemeClr>
+          </a:lnRef>
+          <a:fillRef idx="1">
+            <a:schemeClr val="accent1"/>
+          </a:fillRef>
+          <a:effectRef idx="0">
+            <a:schemeClr val="accent1"/>
+          </a:effectRef>
+          <a:fontRef idx="minor">
+            <a:schemeClr val="lt1"/>
+          </a:fontRef>
+        </p:style>
+        <p:txBody>
+          <a:bodyPr rtlCol="0" anchor="ctr"/>
+          <a:lstStyle/>
+          <a:p>
+            <a:pPr algn="ctr"/>
+            <a:r>
+              <a:rPr lang="en-US" sz="1000">
+                <a:solidFill>
+                  <a:schemeClr val="bg1">
+                    <a:lumMod val="50000"/>
+                  </a:schemeClr>
+                </a:solidFill>
+                <a:latin typeface="IBM Plex Mono" panose="020B0509050203000203" pitchFamily="49" charset="77"/>
+              </a:rPr>
+              <a:t>trader.ts</a:t>
+            </a:r>
+          </a:p>
+        </p:txBody>
+      </p:sp>
+      <p:sp>
+        <p:nvSpPr>
+          <p:cNvPr id="5" name="Rounded Rectangle 4">
+            <a:extLst>
+              <a:ext uri="{FF2B5EF4-FFF2-40B4-BE49-F238E27FC236}">
+                <a16:creationId xmlns:a16="http://schemas.microsoft.com/office/drawing/2014/main" id="{13976EB2-D6C7-3AF3-0958-43EF32AFB41A}"/>
+              </a:ext>
+            </a:extLst>
+          </p:cNvPr>
+          <p:cNvSpPr/>
+          <p:nvPr/>
+        </p:nvSpPr>
+        <p:spPr>
+          <a:xfrm>
+            <a:off x="5710865" y="2190635"/>
+            <a:ext cx="4571875" cy="2653749"/>
+          </a:xfrm>
+          <a:prstGeom prst="roundRect">
+            <a:avLst/>
+          </a:prstGeom>
+          <a:solidFill>
+            <a:schemeClr val="bg1">
+              <a:lumMod val="95000"/>
+            </a:schemeClr>
+          </a:solidFill>
+          <a:ln>
+            <a:solidFill>
+              <a:schemeClr val="tx2">
+                <a:lumMod val="40000"/>
+                <a:lumOff val="60000"/>
+              </a:schemeClr>
+            </a:solidFill>
+          </a:ln>
+        </p:spPr>
+        <p:style>
+          <a:lnRef idx="2">
+            <a:schemeClr val="accent1">
+              <a:shade val="50000"/>
+            </a:schemeClr>
+          </a:lnRef>
+          <a:fillRef idx="1">
+            <a:schemeClr val="accent1"/>
+          </a:fillRef>
+          <a:effectRef idx="0">
+            <a:schemeClr val="accent1"/>
+          </a:effectRef>
+          <a:fontRef idx="minor">
+            <a:schemeClr val="lt1"/>
+          </a:fontRef>
+        </p:style>
+        <p:txBody>
+          <a:bodyPr rtlCol="0" anchor="ctr"/>
+          <a:lstStyle/>
+          <a:p>
+            <a:pPr algn="ctr"/>
+            <a:endParaRPr lang="en-US"/>
+          </a:p>
+        </p:txBody>
+      </p:sp>
+      <p:sp>
+        <p:nvSpPr>
+          <p:cNvPr id="21" name="TextBox 20">
+            <a:extLst>
+              <a:ext uri="{FF2B5EF4-FFF2-40B4-BE49-F238E27FC236}">
+                <a16:creationId xmlns:a16="http://schemas.microsoft.com/office/drawing/2014/main" id="{CC8BBE54-5321-369A-E697-C79336B5F269}"/>
+              </a:ext>
+            </a:extLst>
+          </p:cNvPr>
+          <p:cNvSpPr txBox="1"/>
+          <p:nvPr/>
+        </p:nvSpPr>
+        <p:spPr>
+          <a:xfrm>
+            <a:off x="12322435" y="3517510"/>
+            <a:ext cx="654346" cy="369332"/>
+          </a:xfrm>
+          <a:prstGeom prst="rect">
+            <a:avLst/>
+          </a:prstGeom>
+          <a:noFill/>
+        </p:spPr>
+        <p:txBody>
+          <a:bodyPr wrap="none" rtlCol="0">
+            <a:spAutoFit/>
+          </a:bodyPr>
+          <a:lstStyle/>
+          <a:p>
+            <a:r>
+              <a:rPr lang="en-US"/>
+              <a:t>KIND</a:t>
+            </a:r>
+          </a:p>
+        </p:txBody>
+      </p:sp>
+      <p:sp>
+        <p:nvSpPr>
+          <p:cNvPr id="2" name="TextBox 1">
+            <a:extLst>
+              <a:ext uri="{FF2B5EF4-FFF2-40B4-BE49-F238E27FC236}">
+                <a16:creationId xmlns:a16="http://schemas.microsoft.com/office/drawing/2014/main" id="{86F17F79-3093-C5AB-2B22-C4068E5CD791}"/>
+              </a:ext>
+            </a:extLst>
+          </p:cNvPr>
+          <p:cNvSpPr txBox="1"/>
+          <p:nvPr/>
+        </p:nvSpPr>
+        <p:spPr>
+          <a:xfrm>
+            <a:off x="198783" y="168965"/>
+            <a:ext cx="1812997" cy="369332"/>
+          </a:xfrm>
+          <a:prstGeom prst="rect">
+            <a:avLst/>
+          </a:prstGeom>
+          <a:noFill/>
+        </p:spPr>
+        <p:txBody>
+          <a:bodyPr wrap="none" rtlCol="0">
+            <a:spAutoFit/>
+          </a:bodyPr>
+          <a:lstStyle/>
+          <a:p>
+            <a:r>
+              <a:rPr lang="en-US"/>
+              <a:t>30-chaincode.md</a:t>
+            </a:r>
+          </a:p>
+        </p:txBody>
+      </p:sp>
+      <p:pic>
+        <p:nvPicPr>
+          <p:cNvPr id="17" name="Picture 8">
+            <a:extLst>
+              <a:ext uri="{FF2B5EF4-FFF2-40B4-BE49-F238E27FC236}">
+                <a16:creationId xmlns:a16="http://schemas.microsoft.com/office/drawing/2014/main" id="{22A53A60-23E1-AA24-7D1D-7F819EDBAC69}"/>
+              </a:ext>
+            </a:extLst>
+          </p:cNvPr>
+          <p:cNvPicPr>
+            <a:picLocks noChangeAspect="1" noChangeArrowheads="1"/>
+          </p:cNvPicPr>
+          <p:nvPr/>
+        </p:nvPicPr>
+        <p:blipFill>
+          <a:blip r:embed="rId2">
+            <a:extLst>
+              <a:ext uri="{28A0092B-C50C-407E-A947-70E740481C1C}">
+                <a14:useLocalDpi xmlns:a14="http://schemas.microsoft.com/office/drawing/2010/main" val="0"/>
+              </a:ext>
+            </a:extLst>
+          </a:blip>
+          <a:srcRect/>
+          <a:stretch>
+            <a:fillRect/>
+          </a:stretch>
+        </p:blipFill>
+        <p:spPr bwMode="auto">
+          <a:xfrm>
+            <a:off x="5430785" y="3248201"/>
+            <a:ext cx="574326" cy="556379"/>
+          </a:xfrm>
+          <a:prstGeom prst="rect">
+            <a:avLst/>
+          </a:prstGeom>
+          <a:noFill/>
+          <a:extLst>
+            <a:ext uri="{909E8E84-426E-40DD-AFC4-6F175D3DCCD1}">
+              <a14:hiddenFill xmlns:a14="http://schemas.microsoft.com/office/drawing/2010/main">
+                <a:solidFill>
+                  <a:srgbClr val="FFFFFF"/>
+                </a:solidFill>
+              </a14:hiddenFill>
+            </a:ext>
+          </a:extLst>
+        </p:spPr>
+      </p:pic>
+      <p:sp>
+        <p:nvSpPr>
+          <p:cNvPr id="3" name="Rounded Rectangle 2">
+            <a:extLst>
+              <a:ext uri="{FF2B5EF4-FFF2-40B4-BE49-F238E27FC236}">
+                <a16:creationId xmlns:a16="http://schemas.microsoft.com/office/drawing/2014/main" id="{88C22A4F-96BD-7D12-B6A3-E928F5D54284}"/>
+              </a:ext>
+            </a:extLst>
+          </p:cNvPr>
+          <p:cNvSpPr/>
+          <p:nvPr/>
+        </p:nvSpPr>
+        <p:spPr>
+          <a:xfrm>
+            <a:off x="2421565" y="4005883"/>
+            <a:ext cx="1675116" cy="832674"/>
+          </a:xfrm>
+          <a:prstGeom prst="roundRect">
+            <a:avLst/>
+          </a:prstGeom>
+          <a:solidFill>
+            <a:srgbClr val="7030A0"/>
+          </a:solidFill>
+          <a:ln>
+            <a:solidFill>
+              <a:schemeClr val="bg1">
+                <a:lumMod val="85000"/>
+              </a:schemeClr>
+            </a:solidFill>
+          </a:ln>
+        </p:spPr>
+        <p:style>
+          <a:lnRef idx="2">
+            <a:schemeClr val="accent1">
+              <a:shade val="50000"/>
+            </a:schemeClr>
+          </a:lnRef>
+          <a:fillRef idx="1">
+            <a:schemeClr val="accent1"/>
+          </a:fillRef>
+          <a:effectRef idx="0">
+            <a:schemeClr val="accent1"/>
+          </a:effectRef>
+          <a:fontRef idx="minor">
+            <a:schemeClr val="lt1"/>
+          </a:fontRef>
+        </p:style>
+        <p:txBody>
+          <a:bodyPr rtlCol="0" anchor="ctr"/>
+          <a:lstStyle/>
+          <a:p>
+            <a:pPr algn="ctr"/>
+            <a:r>
+              <a:rPr lang="en-US" sz="1400">
+                <a:solidFill>
+                  <a:schemeClr val="bg1"/>
+                </a:solidFill>
+              </a:rPr>
+              <a:t>Gateway Client Application</a:t>
+            </a:r>
+          </a:p>
+        </p:txBody>
+      </p:sp>
+      <p:cxnSp>
+        <p:nvCxnSpPr>
+          <p:cNvPr id="23" name="Elbow Connector 22">
+            <a:extLst>
+              <a:ext uri="{FF2B5EF4-FFF2-40B4-BE49-F238E27FC236}">
+                <a16:creationId xmlns:a16="http://schemas.microsoft.com/office/drawing/2014/main" id="{2952F4B8-38B2-C9DC-5446-227A5D8D3A6A}"/>
+              </a:ext>
+            </a:extLst>
+          </p:cNvPr>
+          <p:cNvCxnSpPr>
+            <a:cxnSpLocks/>
+            <a:stCxn id="17" idx="3"/>
+            <a:endCxn id="20" idx="1"/>
+          </p:cNvCxnSpPr>
+          <p:nvPr/>
+        </p:nvCxnSpPr>
+        <p:spPr>
+          <a:xfrm>
+            <a:off x="6005111" y="3526391"/>
+            <a:ext cx="1142570" cy="428465"/>
+          </a:xfrm>
+          <a:prstGeom prst="bentConnector3">
+            <a:avLst>
+              <a:gd name="adj1" fmla="val 50000"/>
+            </a:avLst>
+          </a:prstGeom>
+          <a:ln>
+            <a:prstDash val="dash"/>
+          </a:ln>
+        </p:spPr>
+        <p:style>
+          <a:lnRef idx="1">
+            <a:schemeClr val="accent6"/>
+          </a:lnRef>
+          <a:fillRef idx="0">
+            <a:schemeClr val="accent6"/>
+          </a:fillRef>
+          <a:effectRef idx="0">
+            <a:schemeClr val="accent6"/>
+          </a:effectRef>
+          <a:fontRef idx="minor">
+            <a:schemeClr val="tx1"/>
+          </a:fontRef>
+        </p:style>
+      </p:cxnSp>
+      <p:sp>
+        <p:nvSpPr>
+          <p:cNvPr id="25" name="TextBox 24">
+            <a:extLst>
+              <a:ext uri="{FF2B5EF4-FFF2-40B4-BE49-F238E27FC236}">
+                <a16:creationId xmlns:a16="http://schemas.microsoft.com/office/drawing/2014/main" id="{BDB9DEB3-744C-1600-E792-077278F7FA26}"/>
+              </a:ext>
+            </a:extLst>
+          </p:cNvPr>
+          <p:cNvSpPr txBox="1"/>
+          <p:nvPr/>
+        </p:nvSpPr>
+        <p:spPr>
+          <a:xfrm>
+            <a:off x="7189290" y="4442978"/>
+            <a:ext cx="588751" cy="307777"/>
+          </a:xfrm>
+          <a:prstGeom prst="rect">
+            <a:avLst/>
+          </a:prstGeom>
+          <a:noFill/>
+        </p:spPr>
+        <p:txBody>
+          <a:bodyPr wrap="none" rtlCol="0">
+            <a:spAutoFit/>
+          </a:bodyPr>
+          <a:lstStyle/>
+          <a:p>
+            <a:r>
+              <a:rPr lang="en-US" sz="1400"/>
+              <a:t>peers</a:t>
+            </a:r>
+          </a:p>
+        </p:txBody>
+      </p:sp>
+      <p:sp>
+        <p:nvSpPr>
+          <p:cNvPr id="36" name="TextBox 35">
+            <a:extLst>
+              <a:ext uri="{FF2B5EF4-FFF2-40B4-BE49-F238E27FC236}">
+                <a16:creationId xmlns:a16="http://schemas.microsoft.com/office/drawing/2014/main" id="{4A2D68C0-98EC-3910-D501-D0C18277D31D}"/>
+              </a:ext>
+            </a:extLst>
+          </p:cNvPr>
+          <p:cNvSpPr txBox="1"/>
+          <p:nvPr/>
+        </p:nvSpPr>
+        <p:spPr>
+          <a:xfrm>
+            <a:off x="8448571" y="3372143"/>
+            <a:ext cx="1261884" cy="246221"/>
+          </a:xfrm>
+          <a:prstGeom prst="rect">
+            <a:avLst/>
+          </a:prstGeom>
+          <a:noFill/>
+        </p:spPr>
+        <p:txBody>
+          <a:bodyPr wrap="none" rtlCol="0">
+            <a:spAutoFit/>
+          </a:bodyPr>
+          <a:lstStyle/>
+          <a:p>
+            <a:pPr algn="ctr"/>
+            <a:r>
+              <a:rPr lang="en-US" sz="1000">
+                <a:latin typeface="IBM Plex Mono" panose="020B0509050203000203" pitchFamily="49" charset="77"/>
+              </a:rPr>
+              <a:t>asset-transfer</a:t>
+            </a:r>
+          </a:p>
+        </p:txBody>
+      </p:sp>
+      <p:cxnSp>
+        <p:nvCxnSpPr>
+          <p:cNvPr id="45" name="Elbow Connector 44">
+            <a:extLst>
+              <a:ext uri="{FF2B5EF4-FFF2-40B4-BE49-F238E27FC236}">
+                <a16:creationId xmlns:a16="http://schemas.microsoft.com/office/drawing/2014/main" id="{EE6BB463-0C06-E38B-8E69-A479A87E21F1}"/>
+              </a:ext>
+            </a:extLst>
+          </p:cNvPr>
+          <p:cNvCxnSpPr>
+            <a:cxnSpLocks/>
+            <a:stCxn id="3" idx="3"/>
+            <a:endCxn id="17" idx="1"/>
+          </p:cNvCxnSpPr>
+          <p:nvPr/>
+        </p:nvCxnSpPr>
+        <p:spPr>
+          <a:xfrm flipV="1">
+            <a:off x="4096681" y="3526391"/>
+            <a:ext cx="1334104" cy="895829"/>
+          </a:xfrm>
+          <a:prstGeom prst="bentConnector3">
+            <a:avLst>
+              <a:gd name="adj1" fmla="val 50000"/>
+            </a:avLst>
+          </a:prstGeom>
+          <a:ln>
+            <a:headEnd type="none" w="med" len="med"/>
+            <a:tailEnd type="none" w="med" len="med"/>
+          </a:ln>
+        </p:spPr>
+        <p:style>
+          <a:lnRef idx="1">
+            <a:schemeClr val="accent2"/>
+          </a:lnRef>
+          <a:fillRef idx="0">
+            <a:schemeClr val="accent2"/>
+          </a:fillRef>
+          <a:effectRef idx="0">
+            <a:schemeClr val="accent2"/>
+          </a:effectRef>
+          <a:fontRef idx="minor">
+            <a:schemeClr val="tx1"/>
+          </a:fontRef>
+        </p:style>
+      </p:cxnSp>
+      <p:cxnSp>
+        <p:nvCxnSpPr>
+          <p:cNvPr id="53" name="Elbow Connector 52">
+            <a:extLst>
+              <a:ext uri="{FF2B5EF4-FFF2-40B4-BE49-F238E27FC236}">
+                <a16:creationId xmlns:a16="http://schemas.microsoft.com/office/drawing/2014/main" id="{D271B6DF-EB41-54E4-08F8-BC1A392E73D4}"/>
+              </a:ext>
+            </a:extLst>
+          </p:cNvPr>
+          <p:cNvCxnSpPr>
+            <a:cxnSpLocks/>
+            <a:stCxn id="20" idx="3"/>
+            <a:endCxn id="57" idx="1"/>
+          </p:cNvCxnSpPr>
+          <p:nvPr/>
+        </p:nvCxnSpPr>
+        <p:spPr>
+          <a:xfrm flipV="1">
+            <a:off x="7722569" y="3952912"/>
+            <a:ext cx="1069500" cy="1944"/>
+          </a:xfrm>
+          <a:prstGeom prst="bentConnector3">
+            <a:avLst>
+              <a:gd name="adj1" fmla="val 50000"/>
+            </a:avLst>
+          </a:prstGeom>
+          <a:ln>
+            <a:prstDash val="dash"/>
+          </a:ln>
+        </p:spPr>
+        <p:style>
+          <a:lnRef idx="1">
+            <a:schemeClr val="accent6"/>
+          </a:lnRef>
+          <a:fillRef idx="0">
+            <a:schemeClr val="accent6"/>
+          </a:fillRef>
+          <a:effectRef idx="0">
+            <a:schemeClr val="accent6"/>
+          </a:effectRef>
+          <a:fontRef idx="minor">
+            <a:schemeClr val="tx1"/>
+          </a:fontRef>
+        </p:style>
+      </p:cxnSp>
+      <p:pic>
+        <p:nvPicPr>
+          <p:cNvPr id="57" name="Picture 4">
+            <a:extLst>
+              <a:ext uri="{FF2B5EF4-FFF2-40B4-BE49-F238E27FC236}">
+                <a16:creationId xmlns:a16="http://schemas.microsoft.com/office/drawing/2014/main" id="{63480EB3-6C2D-E746-BF95-DBE0C671EF4D}"/>
+              </a:ext>
+            </a:extLst>
+          </p:cNvPr>
+          <p:cNvPicPr>
+            <a:picLocks noChangeAspect="1" noChangeArrowheads="1"/>
+          </p:cNvPicPr>
+          <p:nvPr/>
+        </p:nvPicPr>
+        <p:blipFill>
+          <a:blip r:embed="rId3">
+            <a:extLst>
+              <a:ext uri="{28A0092B-C50C-407E-A947-70E740481C1C}">
+                <a14:useLocalDpi xmlns:a14="http://schemas.microsoft.com/office/drawing/2010/main" val="0"/>
+              </a:ext>
+            </a:extLst>
+          </a:blip>
+          <a:srcRect/>
+          <a:stretch>
+            <a:fillRect/>
+          </a:stretch>
+        </p:blipFill>
+        <p:spPr bwMode="auto">
+          <a:xfrm>
+            <a:off x="8792069" y="3674450"/>
+            <a:ext cx="574888" cy="556923"/>
+          </a:xfrm>
+          <a:prstGeom prst="rect">
+            <a:avLst/>
+          </a:prstGeom>
+          <a:noFill/>
+          <a:extLst>
+            <a:ext uri="{909E8E84-426E-40DD-AFC4-6F175D3DCCD1}">
+              <a14:hiddenFill xmlns:a14="http://schemas.microsoft.com/office/drawing/2010/main">
+                <a:solidFill>
+                  <a:srgbClr val="FFFFFF"/>
+                </a:solidFill>
+              </a14:hiddenFill>
+            </a:ext>
+          </a:extLst>
+        </p:spPr>
+      </p:pic>
+      <p:sp>
+        <p:nvSpPr>
+          <p:cNvPr id="33" name="Folded Corner 32">
+            <a:extLst>
+              <a:ext uri="{FF2B5EF4-FFF2-40B4-BE49-F238E27FC236}">
+                <a16:creationId xmlns:a16="http://schemas.microsoft.com/office/drawing/2014/main" id="{42D11DF8-1F28-CEED-98C3-4AED94EAA11E}"/>
+              </a:ext>
+            </a:extLst>
+          </p:cNvPr>
+          <p:cNvSpPr/>
+          <p:nvPr/>
+        </p:nvSpPr>
+        <p:spPr>
+          <a:xfrm>
+            <a:off x="2498988" y="2954498"/>
+            <a:ext cx="1520270" cy="330213"/>
+          </a:xfrm>
+          <a:prstGeom prst="foldedCorner">
+            <a:avLst/>
+          </a:prstGeom>
+          <a:solidFill>
+            <a:schemeClr val="accent4">
+              <a:lumMod val="20000"/>
+              <a:lumOff val="80000"/>
+            </a:schemeClr>
+          </a:solidFill>
+          <a:ln>
+            <a:solidFill>
+              <a:schemeClr val="bg1">
+                <a:lumMod val="85000"/>
+              </a:schemeClr>
+            </a:solidFill>
+          </a:ln>
+        </p:spPr>
+        <p:style>
+          <a:lnRef idx="2">
+            <a:schemeClr val="accent1">
+              <a:shade val="50000"/>
+            </a:schemeClr>
+          </a:lnRef>
+          <a:fillRef idx="1">
+            <a:schemeClr val="accent1"/>
+          </a:fillRef>
+          <a:effectRef idx="0">
+            <a:schemeClr val="accent1"/>
+          </a:effectRef>
+          <a:fontRef idx="minor">
+            <a:schemeClr val="lt1"/>
+          </a:fontRef>
+        </p:style>
+        <p:txBody>
+          <a:bodyPr rtlCol="0" anchor="ctr"/>
+          <a:lstStyle/>
+          <a:p>
+            <a:pPr algn="ctr"/>
+            <a:r>
+              <a:rPr lang="en-US" sz="1000">
+                <a:solidFill>
+                  <a:schemeClr val="bg1">
+                    <a:lumMod val="50000"/>
+                  </a:schemeClr>
+                </a:solidFill>
+                <a:latin typeface="IBM Plex Mono" panose="020B0509050203000203" pitchFamily="49" charset="77"/>
+              </a:rPr>
+              <a:t>cert.pem</a:t>
+            </a:r>
+          </a:p>
+        </p:txBody>
+      </p:sp>
+      <p:sp>
+        <p:nvSpPr>
+          <p:cNvPr id="34" name="Folded Corner 33">
+            <a:extLst>
+              <a:ext uri="{FF2B5EF4-FFF2-40B4-BE49-F238E27FC236}">
+                <a16:creationId xmlns:a16="http://schemas.microsoft.com/office/drawing/2014/main" id="{0E778E56-3F8C-DFB3-AA69-829E06B70E19}"/>
+              </a:ext>
+            </a:extLst>
+          </p:cNvPr>
+          <p:cNvSpPr/>
+          <p:nvPr/>
+        </p:nvSpPr>
+        <p:spPr>
+          <a:xfrm>
+            <a:off x="2498988" y="3353464"/>
+            <a:ext cx="1520270" cy="330213"/>
+          </a:xfrm>
+          <a:prstGeom prst="foldedCorner">
+            <a:avLst/>
+          </a:prstGeom>
+          <a:solidFill>
+            <a:schemeClr val="accent4">
+              <a:lumMod val="20000"/>
+              <a:lumOff val="80000"/>
+            </a:schemeClr>
+          </a:solidFill>
+          <a:ln>
+            <a:solidFill>
+              <a:schemeClr val="bg1">
+                <a:lumMod val="85000"/>
+              </a:schemeClr>
+            </a:solidFill>
+          </a:ln>
+        </p:spPr>
+        <p:style>
+          <a:lnRef idx="2">
+            <a:schemeClr val="accent1">
+              <a:shade val="50000"/>
+            </a:schemeClr>
+          </a:lnRef>
+          <a:fillRef idx="1">
+            <a:schemeClr val="accent1"/>
+          </a:fillRef>
+          <a:effectRef idx="0">
+            <a:schemeClr val="accent1"/>
+          </a:effectRef>
+          <a:fontRef idx="minor">
+            <a:schemeClr val="lt1"/>
+          </a:fontRef>
+        </p:style>
+        <p:txBody>
+          <a:bodyPr rtlCol="0" anchor="ctr"/>
+          <a:lstStyle/>
+          <a:p>
+            <a:pPr algn="ctr"/>
+            <a:r>
+              <a:rPr lang="en-US" sz="1000">
+                <a:solidFill>
+                  <a:schemeClr val="bg1">
+                    <a:lumMod val="50000"/>
+                  </a:schemeClr>
+                </a:solidFill>
+                <a:latin typeface="IBM Plex Mono" panose="020B0509050203000203" pitchFamily="49" charset="77"/>
+              </a:rPr>
+              <a:t>key.pem</a:t>
+            </a:r>
+          </a:p>
+        </p:txBody>
+      </p:sp>
+      <p:pic>
+        <p:nvPicPr>
+          <p:cNvPr id="40" name="Picture 4">
+            <a:extLst>
+              <a:ext uri="{FF2B5EF4-FFF2-40B4-BE49-F238E27FC236}">
+                <a16:creationId xmlns:a16="http://schemas.microsoft.com/office/drawing/2014/main" id="{736CA4E8-8D9E-DA0F-F1E6-9F396DB8D3DC}"/>
+              </a:ext>
+            </a:extLst>
+          </p:cNvPr>
+          <p:cNvPicPr>
+            <a:picLocks noChangeAspect="1" noChangeArrowheads="1"/>
+          </p:cNvPicPr>
+          <p:nvPr/>
+        </p:nvPicPr>
+        <p:blipFill>
+          <a:blip r:embed="rId3">
+            <a:extLst>
+              <a:ext uri="{28A0092B-C50C-407E-A947-70E740481C1C}">
+                <a14:useLocalDpi xmlns:a14="http://schemas.microsoft.com/office/drawing/2010/main" val="0"/>
+              </a:ext>
+            </a:extLst>
+          </a:blip>
+          <a:srcRect/>
+          <a:stretch>
+            <a:fillRect/>
+          </a:stretch>
+        </p:blipFill>
+        <p:spPr bwMode="auto">
+          <a:xfrm>
+            <a:off x="7147681" y="2578853"/>
+            <a:ext cx="574888" cy="556923"/>
+          </a:xfrm>
+          <a:prstGeom prst="rect">
+            <a:avLst/>
+          </a:prstGeom>
+          <a:noFill/>
+          <a:extLst>
+            <a:ext uri="{909E8E84-426E-40DD-AFC4-6F175D3DCCD1}">
+              <a14:hiddenFill xmlns:a14="http://schemas.microsoft.com/office/drawing/2010/main">
+                <a:solidFill>
+                  <a:srgbClr val="FFFFFF"/>
+                </a:solidFill>
+              </a14:hiddenFill>
+            </a:ext>
+          </a:extLst>
+        </p:spPr>
+      </p:pic>
+      <p:cxnSp>
+        <p:nvCxnSpPr>
+          <p:cNvPr id="41" name="Elbow Connector 40">
+            <a:extLst>
+              <a:ext uri="{FF2B5EF4-FFF2-40B4-BE49-F238E27FC236}">
+                <a16:creationId xmlns:a16="http://schemas.microsoft.com/office/drawing/2014/main" id="{79921ED3-EA23-FCAE-23CA-FE1D4FFA5E2A}"/>
+              </a:ext>
+            </a:extLst>
+          </p:cNvPr>
+          <p:cNvCxnSpPr>
+            <a:cxnSpLocks/>
+            <a:stCxn id="17" idx="3"/>
+            <a:endCxn id="40" idx="1"/>
+          </p:cNvCxnSpPr>
+          <p:nvPr/>
+        </p:nvCxnSpPr>
+        <p:spPr>
+          <a:xfrm flipV="1">
+            <a:off x="6005111" y="2857315"/>
+            <a:ext cx="1142570" cy="669076"/>
+          </a:xfrm>
+          <a:prstGeom prst="bentConnector3">
+            <a:avLst>
+              <a:gd name="adj1" fmla="val 50000"/>
+            </a:avLst>
+          </a:prstGeom>
+          <a:ln>
+            <a:prstDash val="dash"/>
+          </a:ln>
+        </p:spPr>
+        <p:style>
+          <a:lnRef idx="1">
+            <a:schemeClr val="accent6"/>
+          </a:lnRef>
+          <a:fillRef idx="0">
+            <a:schemeClr val="accent6"/>
+          </a:fillRef>
+          <a:effectRef idx="0">
+            <a:schemeClr val="accent6"/>
+          </a:effectRef>
+          <a:fontRef idx="minor">
+            <a:schemeClr val="tx1"/>
+          </a:fontRef>
+        </p:style>
+      </p:cxnSp>
+      <p:sp>
+        <p:nvSpPr>
+          <p:cNvPr id="54" name="TextBox 53">
+            <a:extLst>
+              <a:ext uri="{FF2B5EF4-FFF2-40B4-BE49-F238E27FC236}">
+                <a16:creationId xmlns:a16="http://schemas.microsoft.com/office/drawing/2014/main" id="{2F1F5067-B89C-4F2B-B065-20F7AAA2E5E0}"/>
+              </a:ext>
+            </a:extLst>
+          </p:cNvPr>
+          <p:cNvSpPr txBox="1"/>
+          <p:nvPr/>
+        </p:nvSpPr>
+        <p:spPr>
+          <a:xfrm>
+            <a:off x="7089263" y="2250587"/>
+            <a:ext cx="688778" cy="307777"/>
+          </a:xfrm>
+          <a:prstGeom prst="rect">
+            <a:avLst/>
+          </a:prstGeom>
+          <a:noFill/>
+        </p:spPr>
+        <p:txBody>
+          <a:bodyPr wrap="none" rtlCol="0">
+            <a:spAutoFit/>
+          </a:bodyPr>
+          <a:lstStyle/>
+          <a:p>
+            <a:r>
+              <a:rPr lang="en-US" sz="1400"/>
+              <a:t>Org CA</a:t>
+            </a:r>
+          </a:p>
+        </p:txBody>
+      </p:sp>
+      <p:sp>
+        <p:nvSpPr>
+          <p:cNvPr id="55" name="TextBox 54">
+            <a:extLst>
+              <a:ext uri="{FF2B5EF4-FFF2-40B4-BE49-F238E27FC236}">
+                <a16:creationId xmlns:a16="http://schemas.microsoft.com/office/drawing/2014/main" id="{18EA52FB-F67C-1063-B409-8473FE79D44B}"/>
+              </a:ext>
+            </a:extLst>
+          </p:cNvPr>
+          <p:cNvSpPr txBox="1"/>
+          <p:nvPr/>
+        </p:nvSpPr>
+        <p:spPr>
+          <a:xfrm>
+            <a:off x="8652747" y="4442978"/>
+            <a:ext cx="859146" cy="307777"/>
+          </a:xfrm>
+          <a:prstGeom prst="rect">
+            <a:avLst/>
+          </a:prstGeom>
+          <a:noFill/>
+        </p:spPr>
+        <p:txBody>
+          <a:bodyPr wrap="none" rtlCol="0">
+            <a:spAutoFit/>
+          </a:bodyPr>
+          <a:lstStyle/>
+          <a:p>
+            <a:r>
+              <a:rPr lang="en-US" sz="1400"/>
+              <a:t>contracts</a:t>
+            </a:r>
+          </a:p>
+        </p:txBody>
+      </p:sp>
+      <p:pic>
+        <p:nvPicPr>
+          <p:cNvPr id="60" name="Picture 4">
+            <a:extLst>
+              <a:ext uri="{FF2B5EF4-FFF2-40B4-BE49-F238E27FC236}">
+                <a16:creationId xmlns:a16="http://schemas.microsoft.com/office/drawing/2014/main" id="{F5151F25-FF53-E663-CE62-C7FF92529AAA}"/>
+              </a:ext>
+            </a:extLst>
+          </p:cNvPr>
+          <p:cNvPicPr>
+            <a:picLocks noChangeAspect="1" noChangeArrowheads="1"/>
+          </p:cNvPicPr>
+          <p:nvPr/>
+        </p:nvPicPr>
+        <p:blipFill>
+          <a:blip r:embed="rId3">
+            <a:extLst>
+              <a:ext uri="{28A0092B-C50C-407E-A947-70E740481C1C}">
+                <a14:useLocalDpi xmlns:a14="http://schemas.microsoft.com/office/drawing/2010/main" val="0"/>
+              </a:ext>
+            </a:extLst>
+          </a:blip>
+          <a:srcRect/>
+          <a:stretch>
+            <a:fillRect/>
+          </a:stretch>
+        </p:blipFill>
+        <p:spPr bwMode="auto">
+          <a:xfrm>
+            <a:off x="6997752" y="3553043"/>
+            <a:ext cx="574888" cy="556923"/>
+          </a:xfrm>
+          <a:prstGeom prst="rect">
+            <a:avLst/>
+          </a:prstGeom>
+          <a:noFill/>
+          <a:extLst>
+            <a:ext uri="{909E8E84-426E-40DD-AFC4-6F175D3DCCD1}">
+              <a14:hiddenFill xmlns:a14="http://schemas.microsoft.com/office/drawing/2010/main">
+                <a:solidFill>
+                  <a:srgbClr val="FFFFFF"/>
+                </a:solidFill>
+              </a14:hiddenFill>
+            </a:ext>
+          </a:extLst>
+        </p:spPr>
+      </p:pic>
+      <p:pic>
+        <p:nvPicPr>
+          <p:cNvPr id="20" name="Picture 4">
+            <a:extLst>
+              <a:ext uri="{FF2B5EF4-FFF2-40B4-BE49-F238E27FC236}">
+                <a16:creationId xmlns:a16="http://schemas.microsoft.com/office/drawing/2014/main" id="{3AF04FF4-E856-9CFC-2669-B4E036F8ED64}"/>
+              </a:ext>
+            </a:extLst>
+          </p:cNvPr>
+          <p:cNvPicPr>
+            <a:picLocks noChangeAspect="1" noChangeArrowheads="1"/>
+          </p:cNvPicPr>
+          <p:nvPr/>
+        </p:nvPicPr>
+        <p:blipFill>
+          <a:blip r:embed="rId3">
+            <a:extLst>
+              <a:ext uri="{28A0092B-C50C-407E-A947-70E740481C1C}">
+                <a14:useLocalDpi xmlns:a14="http://schemas.microsoft.com/office/drawing/2010/main" val="0"/>
+              </a:ext>
+            </a:extLst>
+          </a:blip>
+          <a:srcRect/>
+          <a:stretch>
+            <a:fillRect/>
+          </a:stretch>
+        </p:blipFill>
+        <p:spPr bwMode="auto">
+          <a:xfrm>
+            <a:off x="7147681" y="3676394"/>
+            <a:ext cx="574888" cy="556923"/>
+          </a:xfrm>
+          <a:prstGeom prst="rect">
+            <a:avLst/>
+          </a:prstGeom>
+          <a:noFill/>
+          <a:extLst>
+            <a:ext uri="{909E8E84-426E-40DD-AFC4-6F175D3DCCD1}">
+              <a14:hiddenFill xmlns:a14="http://schemas.microsoft.com/office/drawing/2010/main">
+                <a:solidFill>
+                  <a:srgbClr val="FFFFFF"/>
+                </a:solidFill>
+              </a14:hiddenFill>
+            </a:ext>
+          </a:extLst>
+        </p:spPr>
+      </p:pic>
+      <p:sp>
+        <p:nvSpPr>
+          <p:cNvPr id="63" name="Rounded Rectangle 62">
+            <a:extLst>
+              <a:ext uri="{FF2B5EF4-FFF2-40B4-BE49-F238E27FC236}">
+                <a16:creationId xmlns:a16="http://schemas.microsoft.com/office/drawing/2014/main" id="{43CB2076-881B-4FDA-E600-14A727B56F77}"/>
+              </a:ext>
+            </a:extLst>
+          </p:cNvPr>
+          <p:cNvSpPr/>
+          <p:nvPr/>
+        </p:nvSpPr>
+        <p:spPr>
+          <a:xfrm>
+            <a:off x="2421113" y="2190635"/>
+            <a:ext cx="1675116" cy="666680"/>
+          </a:xfrm>
+          <a:prstGeom prst="roundRect">
+            <a:avLst/>
+          </a:prstGeom>
+          <a:solidFill>
+            <a:schemeClr val="bg1">
+              <a:lumMod val="95000"/>
+            </a:schemeClr>
+          </a:solidFill>
+          <a:ln>
+            <a:solidFill>
+              <a:schemeClr val="bg1">
+                <a:lumMod val="85000"/>
+              </a:schemeClr>
+            </a:solidFill>
+          </a:ln>
+        </p:spPr>
+        <p:style>
+          <a:lnRef idx="2">
+            <a:schemeClr val="accent1">
+              <a:shade val="50000"/>
+            </a:schemeClr>
+          </a:lnRef>
+          <a:fillRef idx="1">
+            <a:schemeClr val="accent1"/>
+          </a:fillRef>
+          <a:effectRef idx="0">
+            <a:schemeClr val="accent1"/>
+          </a:effectRef>
+          <a:fontRef idx="minor">
+            <a:schemeClr val="lt1"/>
+          </a:fontRef>
+        </p:style>
+        <p:txBody>
+          <a:bodyPr rtlCol="0" anchor="ctr"/>
+          <a:lstStyle/>
+          <a:p>
+            <a:pPr algn="ctr"/>
+            <a:r>
+              <a:rPr lang="en-US" sz="1400">
+                <a:solidFill>
+                  <a:schemeClr val="accent1">
+                    <a:lumMod val="75000"/>
+                  </a:schemeClr>
+                </a:solidFill>
+              </a:rPr>
+              <a:t>fabric-ca-client</a:t>
+            </a:r>
+          </a:p>
+        </p:txBody>
+      </p:sp>
+      <p:cxnSp>
+        <p:nvCxnSpPr>
+          <p:cNvPr id="65" name="Elbow Connector 64">
+            <a:extLst>
+              <a:ext uri="{FF2B5EF4-FFF2-40B4-BE49-F238E27FC236}">
+                <a16:creationId xmlns:a16="http://schemas.microsoft.com/office/drawing/2014/main" id="{9DE521C6-E88A-BE3B-A340-CF0A687E2548}"/>
+              </a:ext>
+            </a:extLst>
+          </p:cNvPr>
+          <p:cNvCxnSpPr>
+            <a:cxnSpLocks/>
+            <a:endCxn id="17" idx="1"/>
+          </p:cNvCxnSpPr>
+          <p:nvPr/>
+        </p:nvCxnSpPr>
+        <p:spPr>
+          <a:xfrm>
+            <a:off x="4096229" y="2508688"/>
+            <a:ext cx="1334556" cy="1017703"/>
+          </a:xfrm>
+          <a:prstGeom prst="bentConnector3">
+            <a:avLst>
+              <a:gd name="adj1" fmla="val 50000"/>
+            </a:avLst>
+          </a:prstGeom>
+          <a:ln>
+            <a:headEnd type="none" w="med" len="med"/>
+            <a:tailEnd type="none" w="med" len="med"/>
+          </a:ln>
+        </p:spPr>
+        <p:style>
+          <a:lnRef idx="1">
+            <a:schemeClr val="accent2"/>
+          </a:lnRef>
+          <a:fillRef idx="0">
+            <a:schemeClr val="accent2"/>
+          </a:fillRef>
+          <a:effectRef idx="0">
+            <a:schemeClr val="accent2"/>
+          </a:effectRef>
+          <a:fontRef idx="minor">
+            <a:schemeClr val="tx1"/>
+          </a:fontRef>
+        </p:style>
+      </p:cxnSp>
+      <p:sp>
+        <p:nvSpPr>
+          <p:cNvPr id="68" name="TextBox 67">
+            <a:extLst>
+              <a:ext uri="{FF2B5EF4-FFF2-40B4-BE49-F238E27FC236}">
+                <a16:creationId xmlns:a16="http://schemas.microsoft.com/office/drawing/2014/main" id="{CB79A391-0965-B7E1-DA3D-A08A9AB799BC}"/>
+              </a:ext>
+            </a:extLst>
+          </p:cNvPr>
+          <p:cNvSpPr txBox="1"/>
+          <p:nvPr/>
+        </p:nvSpPr>
+        <p:spPr>
+          <a:xfrm>
+            <a:off x="2396895" y="1827779"/>
+            <a:ext cx="1723550" cy="246221"/>
+          </a:xfrm>
+          <a:prstGeom prst="rect">
+            <a:avLst/>
+          </a:prstGeom>
+          <a:noFill/>
+        </p:spPr>
+        <p:txBody>
+          <a:bodyPr wrap="none" rtlCol="0">
+            <a:spAutoFit/>
+          </a:bodyPr>
+          <a:lstStyle/>
+          <a:p>
+            <a:pPr algn="ctr"/>
+            <a:r>
+              <a:rPr lang="en-US" sz="1000" i="1">
+                <a:latin typeface="IBM Plex Mono" panose="020B0509050203000203" pitchFamily="49" charset="77"/>
+              </a:rPr>
+              <a:t>register(); enroll()</a:t>
+            </a:r>
+          </a:p>
+        </p:txBody>
+      </p:sp>
+      <p:sp>
+        <p:nvSpPr>
+          <p:cNvPr id="69" name="TextBox 68">
+            <a:extLst>
+              <a:ext uri="{FF2B5EF4-FFF2-40B4-BE49-F238E27FC236}">
+                <a16:creationId xmlns:a16="http://schemas.microsoft.com/office/drawing/2014/main" id="{6B1A5326-4844-9606-1DDF-62D09DC2D50E}"/>
+              </a:ext>
+            </a:extLst>
+          </p:cNvPr>
+          <p:cNvSpPr txBox="1"/>
+          <p:nvPr/>
+        </p:nvSpPr>
+        <p:spPr>
+          <a:xfrm>
+            <a:off x="2473839" y="4944674"/>
+            <a:ext cx="1569661" cy="246221"/>
+          </a:xfrm>
+          <a:prstGeom prst="rect">
+            <a:avLst/>
+          </a:prstGeom>
+          <a:noFill/>
+        </p:spPr>
+        <p:txBody>
+          <a:bodyPr wrap="none" rtlCol="0">
+            <a:spAutoFit/>
+          </a:bodyPr>
+          <a:lstStyle/>
+          <a:p>
+            <a:pPr algn="ctr"/>
+            <a:r>
+              <a:rPr lang="en-US" sz="1000" i="1">
+                <a:latin typeface="IBM Plex Mono" panose="020B0509050203000203" pitchFamily="49" charset="77"/>
+              </a:rPr>
+              <a:t>npm start transact</a:t>
+            </a:r>
+          </a:p>
+        </p:txBody>
+      </p:sp>
+    </p:spTree>
+    <p:extLst>
+      <p:ext uri="{BB962C8B-B14F-4D97-AF65-F5344CB8AC3E}">
+        <p14:creationId xmlns:p14="http://schemas.microsoft.com/office/powerpoint/2010/main" val="2073500452"/>
+      </p:ext>
+    </p:extLst>
+  </p:cSld>
+  <p:clrMapOvr>
+    <a:masterClrMapping/>
+  </p:clrMapOvr>
+</p:sld>
+</file>
+
 <file path=ppt/theme/theme1.xml><?xml version="1.0" encoding="utf-8"?>
 <a:theme xmlns:a="http://schemas.openxmlformats.org/drawingml/2006/main" name="Office Theme">
   <a:themeElements>

</xml_diff>

<commit_message>
Add readme diagram (#155)
Add readme diagram showing the basic architecture for Parts 1,2,3.

Signed-off-by: David Enyeart <enyeart@us.ibm.com>
</commit_message>
<xml_diff>
--- a/docs/images/CloudReady.pptx
+++ b/docs/images/CloudReady.pptx
@@ -5,7 +5,7 @@
     <p:sldMasterId id="2147483648" r:id="rId1"/>
   </p:sldMasterIdLst>
   <p:sldIdLst>
-    <p:sldId id="257" r:id="rId2"/>
+    <p:sldId id="267" r:id="rId2"/>
     <p:sldId id="266" r:id="rId3"/>
     <p:sldId id="260" r:id="rId4"/>
     <p:sldId id="261" r:id="rId5"/>
@@ -265,7 +265,8 @@
           <a:lstStyle/>
           <a:p>
             <a:fld id="{FEDF1FBF-B18C-8A46-83FA-737EDAEFA390}" type="datetimeFigureOut">
-              <a:t>8/30/22</a:t>
+              <a:rPr lang="en-US"/>
+              <a:t>9/11/22</a:t>
             </a:fld>
             <a:endParaRPr lang="en-US"/>
           </a:p>
@@ -318,6 +319,7 @@
           <a:lstStyle/>
           <a:p>
             <a:fld id="{1B6FDD88-6FD8-C347-9091-EB67E5B3CD6F}" type="slidenum">
+              <a:rPr/>
               <a:t>‹#›</a:t>
             </a:fld>
             <a:endParaRPr lang="en-US"/>
@@ -461,7 +463,8 @@
           <a:lstStyle/>
           <a:p>
             <a:fld id="{FEDF1FBF-B18C-8A46-83FA-737EDAEFA390}" type="datetimeFigureOut">
-              <a:t>8/30/22</a:t>
+              <a:rPr lang="en-US"/>
+              <a:t>9/11/22</a:t>
             </a:fld>
             <a:endParaRPr lang="en-US"/>
           </a:p>
@@ -514,6 +517,7 @@
           <a:lstStyle/>
           <a:p>
             <a:fld id="{1B6FDD88-6FD8-C347-9091-EB67E5B3CD6F}" type="slidenum">
+              <a:rPr/>
               <a:t>‹#›</a:t>
             </a:fld>
             <a:endParaRPr lang="en-US"/>
@@ -667,7 +671,8 @@
           <a:lstStyle/>
           <a:p>
             <a:fld id="{FEDF1FBF-B18C-8A46-83FA-737EDAEFA390}" type="datetimeFigureOut">
-              <a:t>8/30/22</a:t>
+              <a:rPr lang="en-US"/>
+              <a:t>9/11/22</a:t>
             </a:fld>
             <a:endParaRPr lang="en-US"/>
           </a:p>
@@ -720,6 +725,7 @@
           <a:lstStyle/>
           <a:p>
             <a:fld id="{1B6FDD88-6FD8-C347-9091-EB67E5B3CD6F}" type="slidenum">
+              <a:rPr/>
               <a:t>‹#›</a:t>
             </a:fld>
             <a:endParaRPr lang="en-US"/>
@@ -863,7 +869,8 @@
           <a:lstStyle/>
           <a:p>
             <a:fld id="{FEDF1FBF-B18C-8A46-83FA-737EDAEFA390}" type="datetimeFigureOut">
-              <a:t>8/30/22</a:t>
+              <a:rPr lang="en-US"/>
+              <a:t>9/11/22</a:t>
             </a:fld>
             <a:endParaRPr lang="en-US"/>
           </a:p>
@@ -916,6 +923,7 @@
           <a:lstStyle/>
           <a:p>
             <a:fld id="{1B6FDD88-6FD8-C347-9091-EB67E5B3CD6F}" type="slidenum">
+              <a:rPr/>
               <a:t>‹#›</a:t>
             </a:fld>
             <a:endParaRPr lang="en-US"/>
@@ -1136,7 +1144,8 @@
           <a:lstStyle/>
           <a:p>
             <a:fld id="{FEDF1FBF-B18C-8A46-83FA-737EDAEFA390}" type="datetimeFigureOut">
-              <a:t>8/30/22</a:t>
+              <a:rPr lang="en-US"/>
+              <a:t>9/11/22</a:t>
             </a:fld>
             <a:endParaRPr lang="en-US"/>
           </a:p>
@@ -1189,6 +1198,7 @@
           <a:lstStyle/>
           <a:p>
             <a:fld id="{1B6FDD88-6FD8-C347-9091-EB67E5B3CD6F}" type="slidenum">
+              <a:rPr/>
               <a:t>‹#›</a:t>
             </a:fld>
             <a:endParaRPr lang="en-US"/>
@@ -1399,7 +1409,8 @@
           <a:lstStyle/>
           <a:p>
             <a:fld id="{FEDF1FBF-B18C-8A46-83FA-737EDAEFA390}" type="datetimeFigureOut">
-              <a:t>8/30/22</a:t>
+              <a:rPr lang="en-US"/>
+              <a:t>9/11/22</a:t>
             </a:fld>
             <a:endParaRPr lang="en-US"/>
           </a:p>
@@ -1452,6 +1463,7 @@
           <a:lstStyle/>
           <a:p>
             <a:fld id="{1B6FDD88-6FD8-C347-9091-EB67E5B3CD6F}" type="slidenum">
+              <a:rPr/>
               <a:t>‹#›</a:t>
             </a:fld>
             <a:endParaRPr lang="en-US"/>
@@ -1809,7 +1821,8 @@
           <a:lstStyle/>
           <a:p>
             <a:fld id="{FEDF1FBF-B18C-8A46-83FA-737EDAEFA390}" type="datetimeFigureOut">
-              <a:t>8/30/22</a:t>
+              <a:rPr lang="en-US"/>
+              <a:t>9/11/22</a:t>
             </a:fld>
             <a:endParaRPr lang="en-US"/>
           </a:p>
@@ -1862,6 +1875,7 @@
           <a:lstStyle/>
           <a:p>
             <a:fld id="{1B6FDD88-6FD8-C347-9091-EB67E5B3CD6F}" type="slidenum">
+              <a:rPr/>
               <a:t>‹#›</a:t>
             </a:fld>
             <a:endParaRPr lang="en-US"/>
@@ -1948,7 +1962,8 @@
           <a:lstStyle/>
           <a:p>
             <a:fld id="{FEDF1FBF-B18C-8A46-83FA-737EDAEFA390}" type="datetimeFigureOut">
-              <a:t>8/30/22</a:t>
+              <a:rPr lang="en-US"/>
+              <a:t>9/11/22</a:t>
             </a:fld>
             <a:endParaRPr lang="en-US"/>
           </a:p>
@@ -2001,6 +2016,7 @@
           <a:lstStyle/>
           <a:p>
             <a:fld id="{1B6FDD88-6FD8-C347-9091-EB67E5B3CD6F}" type="slidenum">
+              <a:rPr/>
               <a:t>‹#›</a:t>
             </a:fld>
             <a:endParaRPr lang="en-US"/>
@@ -2059,7 +2075,8 @@
           <a:lstStyle/>
           <a:p>
             <a:fld id="{FEDF1FBF-B18C-8A46-83FA-737EDAEFA390}" type="datetimeFigureOut">
-              <a:t>8/30/22</a:t>
+              <a:rPr lang="en-US"/>
+              <a:t>9/11/22</a:t>
             </a:fld>
             <a:endParaRPr lang="en-US"/>
           </a:p>
@@ -2112,6 +2129,7 @@
           <a:lstStyle/>
           <a:p>
             <a:fld id="{1B6FDD88-6FD8-C347-9091-EB67E5B3CD6F}" type="slidenum">
+              <a:rPr/>
               <a:t>‹#›</a:t>
             </a:fld>
             <a:endParaRPr lang="en-US"/>
@@ -2368,7 +2386,8 @@
           <a:lstStyle/>
           <a:p>
             <a:fld id="{FEDF1FBF-B18C-8A46-83FA-737EDAEFA390}" type="datetimeFigureOut">
-              <a:t>8/30/22</a:t>
+              <a:rPr lang="en-US"/>
+              <a:t>9/11/22</a:t>
             </a:fld>
             <a:endParaRPr lang="en-US"/>
           </a:p>
@@ -2421,6 +2440,7 @@
           <a:lstStyle/>
           <a:p>
             <a:fld id="{1B6FDD88-6FD8-C347-9091-EB67E5B3CD6F}" type="slidenum">
+              <a:rPr/>
               <a:t>‹#›</a:t>
             </a:fld>
             <a:endParaRPr lang="en-US"/>
@@ -2654,7 +2674,8 @@
           <a:lstStyle/>
           <a:p>
             <a:fld id="{FEDF1FBF-B18C-8A46-83FA-737EDAEFA390}" type="datetimeFigureOut">
-              <a:t>8/30/22</a:t>
+              <a:rPr lang="en-US"/>
+              <a:t>9/11/22</a:t>
             </a:fld>
             <a:endParaRPr lang="en-US"/>
           </a:p>
@@ -2707,6 +2728,7 @@
           <a:lstStyle/>
           <a:p>
             <a:fld id="{1B6FDD88-6FD8-C347-9091-EB67E5B3CD6F}" type="slidenum">
+              <a:rPr/>
               <a:t>‹#›</a:t>
             </a:fld>
             <a:endParaRPr lang="en-US"/>
@@ -2893,7 +2915,8 @@
           </a:lstStyle>
           <a:p>
             <a:fld id="{FEDF1FBF-B18C-8A46-83FA-737EDAEFA390}" type="datetimeFigureOut">
-              <a:t>8/30/22</a:t>
+              <a:rPr lang="en-US"/>
+              <a:t>9/11/22</a:t>
             </a:fld>
             <a:endParaRPr lang="en-US"/>
           </a:p>
@@ -2982,6 +3005,7 @@
           </a:lstStyle>
           <a:p>
             <a:fld id="{1B6FDD88-6FD8-C347-9091-EB67E5B3CD6F}" type="slidenum">
+              <a:rPr/>
               <a:t>‹#›</a:t>
             </a:fld>
             <a:endParaRPr lang="en-US"/>
@@ -3309,10 +3333,1322 @@
           <a:chExt cx="0" cy="0"/>
         </a:xfrm>
       </p:grpSpPr>
+      <p:cxnSp>
+        <p:nvCxnSpPr>
+          <p:cNvPr id="37" name="Straight Arrow Connector 36">
+            <a:extLst>
+              <a:ext uri="{FF2B5EF4-FFF2-40B4-BE49-F238E27FC236}">
+                <a16:creationId xmlns:a16="http://schemas.microsoft.com/office/drawing/2014/main" id="{CD98EA1E-B675-C405-FD01-AEE0A37A62AD}"/>
+              </a:ext>
+            </a:extLst>
+          </p:cNvPr>
+          <p:cNvCxnSpPr>
+            <a:cxnSpLocks/>
+          </p:cNvCxnSpPr>
+          <p:nvPr/>
+        </p:nvCxnSpPr>
+        <p:spPr>
+          <a:xfrm>
+            <a:off x="3019972" y="1922650"/>
+            <a:ext cx="3131820" cy="0"/>
+          </a:xfrm>
+          <a:prstGeom prst="straightConnector1">
+            <a:avLst/>
+          </a:prstGeom>
+          <a:ln>
+            <a:tailEnd type="triangle"/>
+          </a:ln>
+        </p:spPr>
+        <p:style>
+          <a:lnRef idx="1">
+            <a:schemeClr val="accent1"/>
+          </a:lnRef>
+          <a:fillRef idx="0">
+            <a:schemeClr val="accent1"/>
+          </a:fillRef>
+          <a:effectRef idx="0">
+            <a:schemeClr val="accent1"/>
+          </a:effectRef>
+          <a:fontRef idx="minor">
+            <a:schemeClr val="tx1"/>
+          </a:fontRef>
+        </p:style>
+      </p:cxnSp>
+      <p:cxnSp>
+        <p:nvCxnSpPr>
+          <p:cNvPr id="14" name="Straight Arrow Connector 13">
+            <a:extLst>
+              <a:ext uri="{FF2B5EF4-FFF2-40B4-BE49-F238E27FC236}">
+                <a16:creationId xmlns:a16="http://schemas.microsoft.com/office/drawing/2014/main" id="{C84222B1-8765-8222-D77A-564CD7884510}"/>
+              </a:ext>
+            </a:extLst>
+          </p:cNvPr>
+          <p:cNvCxnSpPr>
+            <a:cxnSpLocks/>
+            <a:stCxn id="4" idx="3"/>
+          </p:cNvCxnSpPr>
+          <p:nvPr/>
+        </p:nvCxnSpPr>
+        <p:spPr>
+          <a:xfrm flipV="1">
+            <a:off x="5809080" y="5619551"/>
+            <a:ext cx="2080122" cy="39846"/>
+          </a:xfrm>
+          <a:prstGeom prst="straightConnector1">
+            <a:avLst/>
+          </a:prstGeom>
+          <a:ln>
+            <a:tailEnd type="triangle"/>
+          </a:ln>
+        </p:spPr>
+        <p:style>
+          <a:lnRef idx="1">
+            <a:schemeClr val="accent1"/>
+          </a:lnRef>
+          <a:fillRef idx="0">
+            <a:schemeClr val="accent1"/>
+          </a:fillRef>
+          <a:effectRef idx="0">
+            <a:schemeClr val="accent1"/>
+          </a:effectRef>
+          <a:fontRef idx="minor">
+            <a:schemeClr val="tx1"/>
+          </a:fontRef>
+        </p:style>
+      </p:cxnSp>
+      <p:sp>
+        <p:nvSpPr>
+          <p:cNvPr id="6" name="Rectangle 5">
+            <a:extLst>
+              <a:ext uri="{FF2B5EF4-FFF2-40B4-BE49-F238E27FC236}">
+                <a16:creationId xmlns:a16="http://schemas.microsoft.com/office/drawing/2014/main" id="{CA4F706D-134A-A17C-48F3-0304FAB4CD3B}"/>
+              </a:ext>
+            </a:extLst>
+          </p:cNvPr>
+          <p:cNvSpPr/>
+          <p:nvPr/>
+        </p:nvSpPr>
+        <p:spPr>
+          <a:xfrm>
+            <a:off x="6536141" y="3667538"/>
+            <a:ext cx="5410693" cy="2826331"/>
+          </a:xfrm>
+          <a:prstGeom prst="rect">
+            <a:avLst/>
+          </a:prstGeom>
+          <a:noFill/>
+        </p:spPr>
+        <p:style>
+          <a:lnRef idx="2">
+            <a:schemeClr val="accent1">
+              <a:shade val="50000"/>
+            </a:schemeClr>
+          </a:lnRef>
+          <a:fillRef idx="1">
+            <a:schemeClr val="accent1"/>
+          </a:fillRef>
+          <a:effectRef idx="0">
+            <a:schemeClr val="accent1"/>
+          </a:effectRef>
+          <a:fontRef idx="minor">
+            <a:schemeClr val="lt1"/>
+          </a:fontRef>
+        </p:style>
+        <p:txBody>
+          <a:bodyPr rtlCol="0" anchor="ctr"/>
+          <a:lstStyle/>
+          <a:p>
+            <a:pPr algn="ctr"/>
+            <a:endParaRPr lang="en-US" sz="1600" dirty="0"/>
+          </a:p>
+        </p:txBody>
+      </p:sp>
+      <p:sp>
+        <p:nvSpPr>
+          <p:cNvPr id="4" name="Rounded Rectangle 3">
+            <a:extLst>
+              <a:ext uri="{FF2B5EF4-FFF2-40B4-BE49-F238E27FC236}">
+                <a16:creationId xmlns:a16="http://schemas.microsoft.com/office/drawing/2014/main" id="{204972F2-01C1-B2B9-A7BA-5CBC45DCBE16}"/>
+              </a:ext>
+            </a:extLst>
+          </p:cNvPr>
+          <p:cNvSpPr/>
+          <p:nvPr/>
+        </p:nvSpPr>
+        <p:spPr>
+          <a:xfrm>
+            <a:off x="3796406" y="5301588"/>
+            <a:ext cx="2012674" cy="715618"/>
+          </a:xfrm>
+          <a:prstGeom prst="roundRect">
+            <a:avLst/>
+          </a:prstGeom>
+        </p:spPr>
+        <p:style>
+          <a:lnRef idx="2">
+            <a:schemeClr val="accent1">
+              <a:shade val="50000"/>
+            </a:schemeClr>
+          </a:lnRef>
+          <a:fillRef idx="1">
+            <a:schemeClr val="accent1"/>
+          </a:fillRef>
+          <a:effectRef idx="0">
+            <a:schemeClr val="accent1"/>
+          </a:effectRef>
+          <a:fontRef idx="minor">
+            <a:schemeClr val="lt1"/>
+          </a:fontRef>
+        </p:style>
+        <p:txBody>
+          <a:bodyPr rtlCol="0" anchor="ctr"/>
+          <a:lstStyle/>
+          <a:p>
+            <a:pPr algn="ctr"/>
+            <a:r>
+              <a:rPr lang="en-US" sz="1600" dirty="0"/>
+              <a:t>Gateway Client Application</a:t>
+            </a:r>
+          </a:p>
+        </p:txBody>
+      </p:sp>
+      <p:sp>
+        <p:nvSpPr>
+          <p:cNvPr id="5" name="Rounded Rectangle 4">
+            <a:extLst>
+              <a:ext uri="{FF2B5EF4-FFF2-40B4-BE49-F238E27FC236}">
+                <a16:creationId xmlns:a16="http://schemas.microsoft.com/office/drawing/2014/main" id="{13976EB2-D6C7-3AF3-0958-43EF32AFB41A}"/>
+              </a:ext>
+            </a:extLst>
+          </p:cNvPr>
+          <p:cNvSpPr/>
+          <p:nvPr/>
+        </p:nvSpPr>
+        <p:spPr>
+          <a:xfrm>
+            <a:off x="7325847" y="4442788"/>
+            <a:ext cx="4171601" cy="1894763"/>
+          </a:xfrm>
+          <a:prstGeom prst="roundRect">
+            <a:avLst/>
+          </a:prstGeom>
+          <a:solidFill>
+            <a:schemeClr val="accent1">
+              <a:lumMod val="20000"/>
+              <a:lumOff val="80000"/>
+            </a:schemeClr>
+          </a:solidFill>
+        </p:spPr>
+        <p:style>
+          <a:lnRef idx="2">
+            <a:schemeClr val="accent1">
+              <a:shade val="50000"/>
+            </a:schemeClr>
+          </a:lnRef>
+          <a:fillRef idx="1">
+            <a:schemeClr val="accent1"/>
+          </a:fillRef>
+          <a:effectRef idx="0">
+            <a:schemeClr val="accent1"/>
+          </a:effectRef>
+          <a:fontRef idx="minor">
+            <a:schemeClr val="lt1"/>
+          </a:fontRef>
+        </p:style>
+        <p:txBody>
+          <a:bodyPr rtlCol="0" anchor="ctr"/>
+          <a:lstStyle/>
+          <a:p>
+            <a:pPr algn="ctr"/>
+            <a:endParaRPr lang="en-US" sz="1600" dirty="0"/>
+          </a:p>
+        </p:txBody>
+      </p:sp>
+      <p:sp>
+        <p:nvSpPr>
+          <p:cNvPr id="8" name="Can 7">
+            <a:extLst>
+              <a:ext uri="{FF2B5EF4-FFF2-40B4-BE49-F238E27FC236}">
+                <a16:creationId xmlns:a16="http://schemas.microsoft.com/office/drawing/2014/main" id="{6641C408-F39C-6D4A-3371-640C0BD188B5}"/>
+              </a:ext>
+            </a:extLst>
+          </p:cNvPr>
+          <p:cNvSpPr/>
+          <p:nvPr/>
+        </p:nvSpPr>
+        <p:spPr>
+          <a:xfrm rot="16200000">
+            <a:off x="6393182" y="5232475"/>
+            <a:ext cx="285918" cy="845147"/>
+          </a:xfrm>
+          <a:prstGeom prst="can">
+            <a:avLst/>
+          </a:prstGeom>
+          <a:solidFill>
+            <a:schemeClr val="accent1">
+              <a:lumMod val="40000"/>
+              <a:lumOff val="60000"/>
+            </a:schemeClr>
+          </a:solidFill>
+        </p:spPr>
+        <p:style>
+          <a:lnRef idx="2">
+            <a:schemeClr val="accent1">
+              <a:shade val="50000"/>
+            </a:schemeClr>
+          </a:lnRef>
+          <a:fillRef idx="1">
+            <a:schemeClr val="accent1"/>
+          </a:fillRef>
+          <a:effectRef idx="0">
+            <a:schemeClr val="accent1"/>
+          </a:effectRef>
+          <a:fontRef idx="minor">
+            <a:schemeClr val="lt1"/>
+          </a:fontRef>
+        </p:style>
+        <p:txBody>
+          <a:bodyPr rtlCol="0" anchor="ctr"/>
+          <a:lstStyle/>
+          <a:p>
+            <a:pPr algn="ctr"/>
+            <a:endParaRPr lang="en-US" sz="1600" dirty="0"/>
+          </a:p>
+        </p:txBody>
+      </p:sp>
+      <p:sp>
+        <p:nvSpPr>
+          <p:cNvPr id="19" name="Rounded Rectangle 18">
+            <a:extLst>
+              <a:ext uri="{FF2B5EF4-FFF2-40B4-BE49-F238E27FC236}">
+                <a16:creationId xmlns:a16="http://schemas.microsoft.com/office/drawing/2014/main" id="{19A41F4F-77C3-DE16-95DE-A5090A4EE314}"/>
+              </a:ext>
+            </a:extLst>
+          </p:cNvPr>
+          <p:cNvSpPr/>
+          <p:nvPr/>
+        </p:nvSpPr>
+        <p:spPr>
+          <a:xfrm>
+            <a:off x="7556085" y="3780209"/>
+            <a:ext cx="2104159" cy="501134"/>
+          </a:xfrm>
+          <a:prstGeom prst="roundRect">
+            <a:avLst/>
+          </a:prstGeom>
+        </p:spPr>
+        <p:style>
+          <a:lnRef idx="2">
+            <a:schemeClr val="accent1">
+              <a:shade val="50000"/>
+            </a:schemeClr>
+          </a:lnRef>
+          <a:fillRef idx="1">
+            <a:schemeClr val="accent1"/>
+          </a:fillRef>
+          <a:effectRef idx="0">
+            <a:schemeClr val="accent1"/>
+          </a:effectRef>
+          <a:fontRef idx="minor">
+            <a:schemeClr val="lt1"/>
+          </a:fontRef>
+        </p:style>
+        <p:txBody>
+          <a:bodyPr rtlCol="0" anchor="ctr"/>
+          <a:lstStyle/>
+          <a:p>
+            <a:pPr algn="ctr"/>
+            <a:r>
+              <a:rPr lang="en-US" sz="1600" dirty="0"/>
+              <a:t>Docker Registry</a:t>
+            </a:r>
+          </a:p>
+        </p:txBody>
+      </p:sp>
+      <p:sp>
+        <p:nvSpPr>
+          <p:cNvPr id="20" name="Rounded Rectangle 19">
+            <a:extLst>
+              <a:ext uri="{FF2B5EF4-FFF2-40B4-BE49-F238E27FC236}">
+                <a16:creationId xmlns:a16="http://schemas.microsoft.com/office/drawing/2014/main" id="{01CEA803-0D3E-E07C-6661-9A22555B9933}"/>
+              </a:ext>
+            </a:extLst>
+          </p:cNvPr>
+          <p:cNvSpPr/>
+          <p:nvPr/>
+        </p:nvSpPr>
+        <p:spPr>
+          <a:xfrm>
+            <a:off x="9613204" y="4764944"/>
+            <a:ext cx="1568317" cy="704775"/>
+          </a:xfrm>
+          <a:prstGeom prst="roundRect">
+            <a:avLst/>
+          </a:prstGeom>
+          <a:solidFill>
+            <a:schemeClr val="accent5"/>
+          </a:solidFill>
+        </p:spPr>
+        <p:style>
+          <a:lnRef idx="2">
+            <a:schemeClr val="accent1">
+              <a:shade val="50000"/>
+            </a:schemeClr>
+          </a:lnRef>
+          <a:fillRef idx="1">
+            <a:schemeClr val="accent1"/>
+          </a:fillRef>
+          <a:effectRef idx="0">
+            <a:schemeClr val="accent1"/>
+          </a:effectRef>
+          <a:fontRef idx="minor">
+            <a:schemeClr val="lt1"/>
+          </a:fontRef>
+        </p:style>
+        <p:txBody>
+          <a:bodyPr rtlCol="0" anchor="ctr"/>
+          <a:lstStyle/>
+          <a:p>
+            <a:pPr algn="ctr"/>
+            <a:r>
+              <a:rPr lang="en-US" sz="1600" dirty="0">
+                <a:solidFill>
+                  <a:schemeClr val="bg1"/>
+                </a:solidFill>
+              </a:rPr>
+              <a:t>asset-</a:t>
+            </a:r>
+            <a:r>
+              <a:rPr lang="en-US" sz="1600" dirty="0" err="1">
+                <a:solidFill>
+                  <a:schemeClr val="bg1"/>
+                </a:solidFill>
+              </a:rPr>
+              <a:t>tx</a:t>
+            </a:r>
+            <a:r>
+              <a:rPr lang="en-US" sz="1600" dirty="0">
+                <a:solidFill>
+                  <a:schemeClr val="bg1"/>
+                </a:solidFill>
+              </a:rPr>
+              <a:t>-cc</a:t>
+            </a:r>
+          </a:p>
+          <a:p>
+            <a:pPr algn="ctr"/>
+            <a:r>
+              <a:rPr lang="en-US" sz="1600" dirty="0">
+                <a:solidFill>
+                  <a:schemeClr val="bg1"/>
+                </a:solidFill>
+              </a:rPr>
+              <a:t>(k8s-builder)</a:t>
+            </a:r>
+          </a:p>
+        </p:txBody>
+      </p:sp>
+      <p:sp>
+        <p:nvSpPr>
+          <p:cNvPr id="21" name="TextBox 20">
+            <a:extLst>
+              <a:ext uri="{FF2B5EF4-FFF2-40B4-BE49-F238E27FC236}">
+                <a16:creationId xmlns:a16="http://schemas.microsoft.com/office/drawing/2014/main" id="{CC8BBE54-5321-369A-E697-C79336B5F269}"/>
+              </a:ext>
+            </a:extLst>
+          </p:cNvPr>
+          <p:cNvSpPr txBox="1"/>
+          <p:nvPr/>
+        </p:nvSpPr>
+        <p:spPr>
+          <a:xfrm>
+            <a:off x="8842915" y="6462813"/>
+            <a:ext cx="592234" cy="338554"/>
+          </a:xfrm>
+          <a:prstGeom prst="rect">
+            <a:avLst/>
+          </a:prstGeom>
+          <a:noFill/>
+        </p:spPr>
+        <p:txBody>
+          <a:bodyPr wrap="square" rtlCol="0">
+            <a:spAutoFit/>
+          </a:bodyPr>
+          <a:lstStyle/>
+          <a:p>
+            <a:r>
+              <a:rPr lang="en-US" sz="1600"/>
+              <a:t>k8s</a:t>
+            </a:r>
+          </a:p>
+        </p:txBody>
+      </p:sp>
+      <p:sp>
+        <p:nvSpPr>
+          <p:cNvPr id="22" name="Rounded Rectangle 21">
+            <a:extLst>
+              <a:ext uri="{FF2B5EF4-FFF2-40B4-BE49-F238E27FC236}">
+                <a16:creationId xmlns:a16="http://schemas.microsoft.com/office/drawing/2014/main" id="{05ADCF78-C0E7-0D2F-99C3-8DAD104FEB00}"/>
+              </a:ext>
+            </a:extLst>
+          </p:cNvPr>
+          <p:cNvSpPr/>
+          <p:nvPr/>
+        </p:nvSpPr>
+        <p:spPr>
+          <a:xfrm>
+            <a:off x="7535619" y="4586043"/>
+            <a:ext cx="1230693" cy="296228"/>
+          </a:xfrm>
+          <a:prstGeom prst="roundRect">
+            <a:avLst/>
+          </a:prstGeom>
+        </p:spPr>
+        <p:style>
+          <a:lnRef idx="2">
+            <a:schemeClr val="accent1">
+              <a:shade val="50000"/>
+            </a:schemeClr>
+          </a:lnRef>
+          <a:fillRef idx="1">
+            <a:schemeClr val="accent1"/>
+          </a:fillRef>
+          <a:effectRef idx="0">
+            <a:schemeClr val="accent1"/>
+          </a:effectRef>
+          <a:fontRef idx="minor">
+            <a:schemeClr val="lt1"/>
+          </a:fontRef>
+        </p:style>
+        <p:txBody>
+          <a:bodyPr rtlCol="0" anchor="ctr"/>
+          <a:lstStyle/>
+          <a:p>
+            <a:pPr algn="ctr"/>
+            <a:r>
+              <a:rPr lang="en-US" sz="1600"/>
+              <a:t>peers</a:t>
+            </a:r>
+          </a:p>
+        </p:txBody>
+      </p:sp>
+      <p:sp>
+        <p:nvSpPr>
+          <p:cNvPr id="23" name="Rounded Rectangle 22">
+            <a:extLst>
+              <a:ext uri="{FF2B5EF4-FFF2-40B4-BE49-F238E27FC236}">
+                <a16:creationId xmlns:a16="http://schemas.microsoft.com/office/drawing/2014/main" id="{D1E403FB-36C6-317B-CDF6-71BAF45728C3}"/>
+              </a:ext>
+            </a:extLst>
+          </p:cNvPr>
+          <p:cNvSpPr/>
+          <p:nvPr/>
+        </p:nvSpPr>
+        <p:spPr>
+          <a:xfrm>
+            <a:off x="7688019" y="4738443"/>
+            <a:ext cx="1230693" cy="296228"/>
+          </a:xfrm>
+          <a:prstGeom prst="roundRect">
+            <a:avLst/>
+          </a:prstGeom>
+        </p:spPr>
+        <p:style>
+          <a:lnRef idx="2">
+            <a:schemeClr val="accent1">
+              <a:shade val="50000"/>
+            </a:schemeClr>
+          </a:lnRef>
+          <a:fillRef idx="1">
+            <a:schemeClr val="accent1"/>
+          </a:fillRef>
+          <a:effectRef idx="0">
+            <a:schemeClr val="accent1"/>
+          </a:effectRef>
+          <a:fontRef idx="minor">
+            <a:schemeClr val="lt1"/>
+          </a:fontRef>
+        </p:style>
+        <p:txBody>
+          <a:bodyPr rtlCol="0" anchor="ctr"/>
+          <a:lstStyle/>
+          <a:p>
+            <a:pPr algn="ctr"/>
+            <a:r>
+              <a:rPr lang="en-US" sz="1600"/>
+              <a:t>peers</a:t>
+            </a:r>
+          </a:p>
+        </p:txBody>
+      </p:sp>
+      <p:sp>
+        <p:nvSpPr>
+          <p:cNvPr id="24" name="Rounded Rectangle 23">
+            <a:extLst>
+              <a:ext uri="{FF2B5EF4-FFF2-40B4-BE49-F238E27FC236}">
+                <a16:creationId xmlns:a16="http://schemas.microsoft.com/office/drawing/2014/main" id="{CD36B1A8-B9A8-9EC1-3E03-89108BE8A49E}"/>
+              </a:ext>
+            </a:extLst>
+          </p:cNvPr>
+          <p:cNvSpPr/>
+          <p:nvPr/>
+        </p:nvSpPr>
+        <p:spPr>
+          <a:xfrm>
+            <a:off x="7840419" y="4890843"/>
+            <a:ext cx="1230693" cy="296228"/>
+          </a:xfrm>
+          <a:prstGeom prst="roundRect">
+            <a:avLst/>
+          </a:prstGeom>
+        </p:spPr>
+        <p:style>
+          <a:lnRef idx="2">
+            <a:schemeClr val="accent1">
+              <a:shade val="50000"/>
+            </a:schemeClr>
+          </a:lnRef>
+          <a:fillRef idx="1">
+            <a:schemeClr val="accent1"/>
+          </a:fillRef>
+          <a:effectRef idx="0">
+            <a:schemeClr val="accent1"/>
+          </a:effectRef>
+          <a:fontRef idx="minor">
+            <a:schemeClr val="lt1"/>
+          </a:fontRef>
+        </p:style>
+        <p:txBody>
+          <a:bodyPr rtlCol="0" anchor="ctr"/>
+          <a:lstStyle/>
+          <a:p>
+            <a:pPr algn="ctr"/>
+            <a:r>
+              <a:rPr lang="en-US" sz="1600"/>
+              <a:t>peers</a:t>
+            </a:r>
+          </a:p>
+        </p:txBody>
+      </p:sp>
+      <p:sp>
+        <p:nvSpPr>
+          <p:cNvPr id="25" name="Rounded Rectangle 24">
+            <a:extLst>
+              <a:ext uri="{FF2B5EF4-FFF2-40B4-BE49-F238E27FC236}">
+                <a16:creationId xmlns:a16="http://schemas.microsoft.com/office/drawing/2014/main" id="{9D135A26-1430-8136-BF83-CA47162F27A8}"/>
+              </a:ext>
+            </a:extLst>
+          </p:cNvPr>
+          <p:cNvSpPr/>
+          <p:nvPr/>
+        </p:nvSpPr>
+        <p:spPr>
+          <a:xfrm>
+            <a:off x="7992819" y="5043243"/>
+            <a:ext cx="1230693" cy="296228"/>
+          </a:xfrm>
+          <a:prstGeom prst="roundRect">
+            <a:avLst/>
+          </a:prstGeom>
+        </p:spPr>
+        <p:style>
+          <a:lnRef idx="2">
+            <a:schemeClr val="accent1">
+              <a:shade val="50000"/>
+            </a:schemeClr>
+          </a:lnRef>
+          <a:fillRef idx="1">
+            <a:schemeClr val="accent1"/>
+          </a:fillRef>
+          <a:effectRef idx="0">
+            <a:schemeClr val="accent1"/>
+          </a:effectRef>
+          <a:fontRef idx="minor">
+            <a:schemeClr val="lt1"/>
+          </a:fontRef>
+        </p:style>
+        <p:txBody>
+          <a:bodyPr rtlCol="0" anchor="ctr"/>
+          <a:lstStyle/>
+          <a:p>
+            <a:pPr algn="ctr"/>
+            <a:r>
+              <a:rPr lang="en-US" sz="1600"/>
+              <a:t>peers</a:t>
+            </a:r>
+          </a:p>
+        </p:txBody>
+      </p:sp>
+      <p:sp>
+        <p:nvSpPr>
+          <p:cNvPr id="26" name="Rounded Rectangle 25">
+            <a:extLst>
+              <a:ext uri="{FF2B5EF4-FFF2-40B4-BE49-F238E27FC236}">
+                <a16:creationId xmlns:a16="http://schemas.microsoft.com/office/drawing/2014/main" id="{808A7418-6164-8839-3231-9E71A76DEB94}"/>
+              </a:ext>
+            </a:extLst>
+          </p:cNvPr>
+          <p:cNvSpPr/>
+          <p:nvPr/>
+        </p:nvSpPr>
+        <p:spPr>
+          <a:xfrm>
+            <a:off x="7551715" y="5630445"/>
+            <a:ext cx="1230693" cy="296228"/>
+          </a:xfrm>
+          <a:prstGeom prst="roundRect">
+            <a:avLst/>
+          </a:prstGeom>
+        </p:spPr>
+        <p:style>
+          <a:lnRef idx="2">
+            <a:schemeClr val="accent1">
+              <a:shade val="50000"/>
+            </a:schemeClr>
+          </a:lnRef>
+          <a:fillRef idx="1">
+            <a:schemeClr val="accent1"/>
+          </a:fillRef>
+          <a:effectRef idx="0">
+            <a:schemeClr val="accent1"/>
+          </a:effectRef>
+          <a:fontRef idx="minor">
+            <a:schemeClr val="lt1"/>
+          </a:fontRef>
+        </p:style>
+        <p:txBody>
+          <a:bodyPr rtlCol="0" anchor="ctr"/>
+          <a:lstStyle/>
+          <a:p>
+            <a:pPr algn="ctr"/>
+            <a:endParaRPr lang="en-US" sz="1600"/>
+          </a:p>
+        </p:txBody>
+      </p:sp>
+      <p:sp>
+        <p:nvSpPr>
+          <p:cNvPr id="29" name="Rounded Rectangle 28">
+            <a:extLst>
+              <a:ext uri="{FF2B5EF4-FFF2-40B4-BE49-F238E27FC236}">
+                <a16:creationId xmlns:a16="http://schemas.microsoft.com/office/drawing/2014/main" id="{4C394D26-AA2D-36F5-7CD0-61F9C9DF9CBC}"/>
+              </a:ext>
+            </a:extLst>
+          </p:cNvPr>
+          <p:cNvSpPr/>
+          <p:nvPr/>
+        </p:nvSpPr>
+        <p:spPr>
+          <a:xfrm>
+            <a:off x="7704115" y="5782845"/>
+            <a:ext cx="1230693" cy="296228"/>
+          </a:xfrm>
+          <a:prstGeom prst="roundRect">
+            <a:avLst/>
+          </a:prstGeom>
+        </p:spPr>
+        <p:style>
+          <a:lnRef idx="2">
+            <a:schemeClr val="accent1">
+              <a:shade val="50000"/>
+            </a:schemeClr>
+          </a:lnRef>
+          <a:fillRef idx="1">
+            <a:schemeClr val="accent1"/>
+          </a:fillRef>
+          <a:effectRef idx="0">
+            <a:schemeClr val="accent1"/>
+          </a:effectRef>
+          <a:fontRef idx="minor">
+            <a:schemeClr val="lt1"/>
+          </a:fontRef>
+        </p:style>
+        <p:txBody>
+          <a:bodyPr rtlCol="0" anchor="ctr"/>
+          <a:lstStyle/>
+          <a:p>
+            <a:pPr algn="ctr"/>
+            <a:endParaRPr lang="en-US" sz="1600"/>
+          </a:p>
+        </p:txBody>
+      </p:sp>
+      <p:sp>
+        <p:nvSpPr>
+          <p:cNvPr id="30" name="Rounded Rectangle 29">
+            <a:extLst>
+              <a:ext uri="{FF2B5EF4-FFF2-40B4-BE49-F238E27FC236}">
+                <a16:creationId xmlns:a16="http://schemas.microsoft.com/office/drawing/2014/main" id="{4F0AA772-F354-33D7-ACFD-FD7ED147ABC4}"/>
+              </a:ext>
+            </a:extLst>
+          </p:cNvPr>
+          <p:cNvSpPr/>
+          <p:nvPr/>
+        </p:nvSpPr>
+        <p:spPr>
+          <a:xfrm>
+            <a:off x="7856515" y="5935245"/>
+            <a:ext cx="1230693" cy="296228"/>
+          </a:xfrm>
+          <a:prstGeom prst="roundRect">
+            <a:avLst/>
+          </a:prstGeom>
+        </p:spPr>
+        <p:style>
+          <a:lnRef idx="2">
+            <a:schemeClr val="accent1">
+              <a:shade val="50000"/>
+            </a:schemeClr>
+          </a:lnRef>
+          <a:fillRef idx="1">
+            <a:schemeClr val="accent1"/>
+          </a:fillRef>
+          <a:effectRef idx="0">
+            <a:schemeClr val="accent1"/>
+          </a:effectRef>
+          <a:fontRef idx="minor">
+            <a:schemeClr val="lt1"/>
+          </a:fontRef>
+        </p:style>
+        <p:txBody>
+          <a:bodyPr rtlCol="0" anchor="ctr"/>
+          <a:lstStyle/>
+          <a:p>
+            <a:pPr algn="ctr"/>
+            <a:r>
+              <a:rPr lang="en-US" sz="1600"/>
+              <a:t>orderers</a:t>
+            </a:r>
+          </a:p>
+        </p:txBody>
+      </p:sp>
+      <p:cxnSp>
+        <p:nvCxnSpPr>
+          <p:cNvPr id="32" name="Elbow Connector 31">
+            <a:extLst>
+              <a:ext uri="{FF2B5EF4-FFF2-40B4-BE49-F238E27FC236}">
+                <a16:creationId xmlns:a16="http://schemas.microsoft.com/office/drawing/2014/main" id="{5B4B1CE6-2E15-54F8-7375-78A305B54A3C}"/>
+              </a:ext>
+            </a:extLst>
+          </p:cNvPr>
+          <p:cNvCxnSpPr>
+            <a:cxnSpLocks/>
+            <a:stCxn id="19" idx="3"/>
+            <a:endCxn id="20" idx="0"/>
+          </p:cNvCxnSpPr>
+          <p:nvPr/>
+        </p:nvCxnSpPr>
+        <p:spPr>
+          <a:xfrm>
+            <a:off x="9660244" y="4030776"/>
+            <a:ext cx="737119" cy="734168"/>
+          </a:xfrm>
+          <a:prstGeom prst="bentConnector2">
+            <a:avLst/>
+          </a:prstGeom>
+          <a:ln>
+            <a:tailEnd type="triangle"/>
+          </a:ln>
+        </p:spPr>
+        <p:style>
+          <a:lnRef idx="1">
+            <a:schemeClr val="accent1"/>
+          </a:lnRef>
+          <a:fillRef idx="0">
+            <a:schemeClr val="accent1"/>
+          </a:fillRef>
+          <a:effectRef idx="0">
+            <a:schemeClr val="accent1"/>
+          </a:effectRef>
+          <a:fontRef idx="minor">
+            <a:schemeClr val="tx1"/>
+          </a:fontRef>
+        </p:style>
+      </p:cxnSp>
+      <p:sp>
+        <p:nvSpPr>
+          <p:cNvPr id="3" name="Rounded Rectangle 2">
+            <a:extLst>
+              <a:ext uri="{FF2B5EF4-FFF2-40B4-BE49-F238E27FC236}">
+                <a16:creationId xmlns:a16="http://schemas.microsoft.com/office/drawing/2014/main" id="{B1B8E9BC-F4D6-BDE8-21FC-FC6C561C9E91}"/>
+              </a:ext>
+            </a:extLst>
+          </p:cNvPr>
+          <p:cNvSpPr/>
+          <p:nvPr/>
+        </p:nvSpPr>
+        <p:spPr>
+          <a:xfrm>
+            <a:off x="9613204" y="5931535"/>
+            <a:ext cx="1568317" cy="296228"/>
+          </a:xfrm>
+          <a:prstGeom prst="roundRect">
+            <a:avLst/>
+          </a:prstGeom>
+          <a:solidFill>
+            <a:srgbClr val="7030A0"/>
+          </a:solidFill>
+        </p:spPr>
+        <p:style>
+          <a:lnRef idx="2">
+            <a:schemeClr val="accent1">
+              <a:shade val="50000"/>
+            </a:schemeClr>
+          </a:lnRef>
+          <a:fillRef idx="1">
+            <a:schemeClr val="accent1"/>
+          </a:fillRef>
+          <a:effectRef idx="0">
+            <a:schemeClr val="accent1"/>
+          </a:effectRef>
+          <a:fontRef idx="minor">
+            <a:schemeClr val="lt1"/>
+          </a:fontRef>
+        </p:style>
+        <p:txBody>
+          <a:bodyPr rtlCol="0" anchor="ctr"/>
+          <a:lstStyle/>
+          <a:p>
+            <a:pPr algn="ctr"/>
+            <a:r>
+              <a:rPr lang="en-US" sz="1400" b="1"/>
+              <a:t>fabric-operator</a:t>
+            </a:r>
+          </a:p>
+        </p:txBody>
+      </p:sp>
+      <p:sp>
+        <p:nvSpPr>
+          <p:cNvPr id="27" name="Rounded Rectangle 26">
+            <a:extLst>
+              <a:ext uri="{FF2B5EF4-FFF2-40B4-BE49-F238E27FC236}">
+                <a16:creationId xmlns:a16="http://schemas.microsoft.com/office/drawing/2014/main" id="{4DDA98B9-2D83-3B99-609A-8F9DA11138F6}"/>
+              </a:ext>
+            </a:extLst>
+          </p:cNvPr>
+          <p:cNvSpPr/>
+          <p:nvPr/>
+        </p:nvSpPr>
+        <p:spPr>
+          <a:xfrm>
+            <a:off x="1522642" y="1570263"/>
+            <a:ext cx="1932716" cy="715618"/>
+          </a:xfrm>
+          <a:prstGeom prst="roundRect">
+            <a:avLst/>
+          </a:prstGeom>
+        </p:spPr>
+        <p:style>
+          <a:lnRef idx="2">
+            <a:schemeClr val="accent1">
+              <a:shade val="50000"/>
+            </a:schemeClr>
+          </a:lnRef>
+          <a:fillRef idx="1">
+            <a:schemeClr val="accent1"/>
+          </a:fillRef>
+          <a:effectRef idx="0">
+            <a:schemeClr val="accent1"/>
+          </a:effectRef>
+          <a:fontRef idx="minor">
+            <a:schemeClr val="lt1"/>
+          </a:fontRef>
+        </p:style>
+        <p:txBody>
+          <a:bodyPr rtlCol="0" anchor="ctr"/>
+          <a:lstStyle/>
+          <a:p>
+            <a:pPr algn="ctr"/>
+            <a:r>
+              <a:rPr lang="en-US" sz="1600"/>
+              <a:t>Gateway Client Application</a:t>
+            </a:r>
+          </a:p>
+        </p:txBody>
+      </p:sp>
+      <p:sp>
+        <p:nvSpPr>
+          <p:cNvPr id="31" name="Rounded Rectangle 30">
+            <a:extLst>
+              <a:ext uri="{FF2B5EF4-FFF2-40B4-BE49-F238E27FC236}">
+                <a16:creationId xmlns:a16="http://schemas.microsoft.com/office/drawing/2014/main" id="{C7ADFDB3-BB05-43F7-A46D-CBE7255B4541}"/>
+              </a:ext>
+            </a:extLst>
+          </p:cNvPr>
+          <p:cNvSpPr/>
+          <p:nvPr/>
+        </p:nvSpPr>
+        <p:spPr>
+          <a:xfrm>
+            <a:off x="4183075" y="1570263"/>
+            <a:ext cx="1568316" cy="704775"/>
+          </a:xfrm>
+          <a:prstGeom prst="roundRect">
+            <a:avLst/>
+          </a:prstGeom>
+        </p:spPr>
+        <p:style>
+          <a:lnRef idx="2">
+            <a:schemeClr val="accent1">
+              <a:shade val="50000"/>
+            </a:schemeClr>
+          </a:lnRef>
+          <a:fillRef idx="1">
+            <a:schemeClr val="accent1"/>
+          </a:fillRef>
+          <a:effectRef idx="0">
+            <a:schemeClr val="accent1"/>
+          </a:effectRef>
+          <a:fontRef idx="minor">
+            <a:schemeClr val="lt1"/>
+          </a:fontRef>
+        </p:style>
+        <p:txBody>
+          <a:bodyPr rtlCol="0" anchor="ctr"/>
+          <a:lstStyle/>
+          <a:p>
+            <a:pPr algn="ctr"/>
+            <a:r>
+              <a:rPr lang="en-US" sz="1600" dirty="0"/>
+              <a:t>MicroFab</a:t>
+            </a:r>
+          </a:p>
+          <a:p>
+            <a:pPr algn="ctr"/>
+            <a:r>
+              <a:rPr lang="en-US" sz="1600" dirty="0"/>
+              <a:t>Orderer/Peer</a:t>
+            </a:r>
+          </a:p>
+        </p:txBody>
+      </p:sp>
+      <p:sp>
+        <p:nvSpPr>
+          <p:cNvPr id="34" name="Rounded Rectangle 33">
+            <a:extLst>
+              <a:ext uri="{FF2B5EF4-FFF2-40B4-BE49-F238E27FC236}">
+                <a16:creationId xmlns:a16="http://schemas.microsoft.com/office/drawing/2014/main" id="{0AA9B5A1-56F1-6766-2916-1B4B5187E689}"/>
+              </a:ext>
+            </a:extLst>
+          </p:cNvPr>
+          <p:cNvSpPr/>
+          <p:nvPr/>
+        </p:nvSpPr>
+        <p:spPr>
+          <a:xfrm>
+            <a:off x="5967302" y="1570263"/>
+            <a:ext cx="1568317" cy="704775"/>
+          </a:xfrm>
+          <a:prstGeom prst="roundRect">
+            <a:avLst/>
+          </a:prstGeom>
+          <a:solidFill>
+            <a:schemeClr val="accent5"/>
+          </a:solidFill>
+        </p:spPr>
+        <p:style>
+          <a:lnRef idx="2">
+            <a:schemeClr val="accent1">
+              <a:shade val="50000"/>
+            </a:schemeClr>
+          </a:lnRef>
+          <a:fillRef idx="1">
+            <a:schemeClr val="accent1"/>
+          </a:fillRef>
+          <a:effectRef idx="0">
+            <a:schemeClr val="accent1"/>
+          </a:effectRef>
+          <a:fontRef idx="minor">
+            <a:schemeClr val="lt1"/>
+          </a:fontRef>
+        </p:style>
+        <p:txBody>
+          <a:bodyPr rtlCol="0" anchor="ctr"/>
+          <a:lstStyle/>
+          <a:p>
+            <a:pPr algn="ctr"/>
+            <a:r>
+              <a:rPr lang="en-US" sz="1600"/>
+              <a:t>asset-tx-cc</a:t>
+            </a:r>
+            <a:endParaRPr lang="en-US" sz="1600" dirty="0"/>
+          </a:p>
+          <a:p>
+            <a:pPr algn="ctr"/>
+            <a:r>
+              <a:rPr lang="en-US" sz="1600" dirty="0"/>
+              <a:t>(external ccaas)</a:t>
+            </a:r>
+          </a:p>
+        </p:txBody>
+      </p:sp>
+      <p:sp>
+        <p:nvSpPr>
+          <p:cNvPr id="42" name="Rectangular Callout 41">
+            <a:extLst>
+              <a:ext uri="{FF2B5EF4-FFF2-40B4-BE49-F238E27FC236}">
+                <a16:creationId xmlns:a16="http://schemas.microsoft.com/office/drawing/2014/main" id="{4A90EA2C-CDEA-F938-CE4F-B153B3615E23}"/>
+              </a:ext>
+            </a:extLst>
+          </p:cNvPr>
+          <p:cNvSpPr/>
+          <p:nvPr/>
+        </p:nvSpPr>
+        <p:spPr>
+          <a:xfrm>
+            <a:off x="1707747" y="681944"/>
+            <a:ext cx="4194313" cy="413199"/>
+          </a:xfrm>
+          <a:prstGeom prst="wedgeRectCallout">
+            <a:avLst>
+              <a:gd name="adj1" fmla="val 60092"/>
+              <a:gd name="adj2" fmla="val 161844"/>
+            </a:avLst>
+          </a:prstGeom>
+          <a:solidFill>
+            <a:schemeClr val="accent4">
+              <a:lumMod val="20000"/>
+              <a:lumOff val="80000"/>
+            </a:schemeClr>
+          </a:solidFill>
+        </p:spPr>
+        <p:style>
+          <a:lnRef idx="2">
+            <a:schemeClr val="accent1">
+              <a:shade val="50000"/>
+            </a:schemeClr>
+          </a:lnRef>
+          <a:fillRef idx="1">
+            <a:schemeClr val="accent1"/>
+          </a:fillRef>
+          <a:effectRef idx="0">
+            <a:schemeClr val="accent1"/>
+          </a:effectRef>
+          <a:fontRef idx="minor">
+            <a:schemeClr val="lt1"/>
+          </a:fontRef>
+        </p:style>
+        <p:txBody>
+          <a:bodyPr rtlCol="0" anchor="ctr"/>
+          <a:lstStyle/>
+          <a:p>
+            <a:pPr algn="ctr"/>
+            <a:r>
+              <a:rPr lang="en-US">
+                <a:solidFill>
+                  <a:schemeClr val="tx1"/>
+                </a:solidFill>
+              </a:rPr>
+              <a:t>Part 1: Smart Contract Development</a:t>
+            </a:r>
+          </a:p>
+        </p:txBody>
+      </p:sp>
+      <p:sp>
+        <p:nvSpPr>
+          <p:cNvPr id="43" name="Rectangular Callout 42">
+            <a:extLst>
+              <a:ext uri="{FF2B5EF4-FFF2-40B4-BE49-F238E27FC236}">
+                <a16:creationId xmlns:a16="http://schemas.microsoft.com/office/drawing/2014/main" id="{400EC9D2-D06B-8B75-68F5-082E5193FF34}"/>
+              </a:ext>
+            </a:extLst>
+          </p:cNvPr>
+          <p:cNvSpPr/>
+          <p:nvPr/>
+        </p:nvSpPr>
+        <p:spPr>
+          <a:xfrm>
+            <a:off x="1707747" y="2815683"/>
+            <a:ext cx="4194313" cy="413199"/>
+          </a:xfrm>
+          <a:prstGeom prst="wedgeRectCallout">
+            <a:avLst>
+              <a:gd name="adj1" fmla="val -42196"/>
+              <a:gd name="adj2" fmla="val -169864"/>
+            </a:avLst>
+          </a:prstGeom>
+          <a:solidFill>
+            <a:schemeClr val="accent4">
+              <a:lumMod val="20000"/>
+              <a:lumOff val="80000"/>
+            </a:schemeClr>
+          </a:solidFill>
+        </p:spPr>
+        <p:style>
+          <a:lnRef idx="2">
+            <a:schemeClr val="accent1">
+              <a:shade val="50000"/>
+            </a:schemeClr>
+          </a:lnRef>
+          <a:fillRef idx="1">
+            <a:schemeClr val="accent1"/>
+          </a:fillRef>
+          <a:effectRef idx="0">
+            <a:schemeClr val="accent1"/>
+          </a:effectRef>
+          <a:fontRef idx="minor">
+            <a:schemeClr val="lt1"/>
+          </a:fontRef>
+        </p:style>
+        <p:txBody>
+          <a:bodyPr rtlCol="0" anchor="ctr"/>
+          <a:lstStyle/>
+          <a:p>
+            <a:pPr algn="ctr"/>
+            <a:r>
+              <a:rPr lang="en-US">
+                <a:solidFill>
+                  <a:schemeClr val="tx1"/>
+                </a:solidFill>
+              </a:rPr>
+              <a:t>Part 2: Client Application Development</a:t>
+            </a:r>
+          </a:p>
+        </p:txBody>
+      </p:sp>
+      <p:sp>
+        <p:nvSpPr>
+          <p:cNvPr id="44" name="Rectangular Callout 43">
+            <a:extLst>
+              <a:ext uri="{FF2B5EF4-FFF2-40B4-BE49-F238E27FC236}">
+                <a16:creationId xmlns:a16="http://schemas.microsoft.com/office/drawing/2014/main" id="{1EC2D92D-C85F-1240-ACAA-5196F7ADA54A}"/>
+              </a:ext>
+            </a:extLst>
+          </p:cNvPr>
+          <p:cNvSpPr/>
+          <p:nvPr/>
+        </p:nvSpPr>
+        <p:spPr>
+          <a:xfrm>
+            <a:off x="1707747" y="4030776"/>
+            <a:ext cx="4499585" cy="413199"/>
+          </a:xfrm>
+          <a:prstGeom prst="wedgeRectCallout">
+            <a:avLst>
+              <a:gd name="adj1" fmla="val 54916"/>
+              <a:gd name="adj2" fmla="val 141637"/>
+            </a:avLst>
+          </a:prstGeom>
+          <a:solidFill>
+            <a:schemeClr val="accent4">
+              <a:lumMod val="20000"/>
+              <a:lumOff val="80000"/>
+            </a:schemeClr>
+          </a:solidFill>
+        </p:spPr>
+        <p:style>
+          <a:lnRef idx="2">
+            <a:schemeClr val="accent1">
+              <a:shade val="50000"/>
+            </a:schemeClr>
+          </a:lnRef>
+          <a:fillRef idx="1">
+            <a:schemeClr val="accent1"/>
+          </a:fillRef>
+          <a:effectRef idx="0">
+            <a:schemeClr val="accent1"/>
+          </a:effectRef>
+          <a:fontRef idx="minor">
+            <a:schemeClr val="lt1"/>
+          </a:fontRef>
+        </p:style>
+        <p:txBody>
+          <a:bodyPr rtlCol="0" anchor="ctr"/>
+          <a:lstStyle/>
+          <a:p>
+            <a:pPr algn="ctr"/>
+            <a:r>
+              <a:rPr lang="en-US">
+                <a:solidFill>
+                  <a:schemeClr val="tx1"/>
+                </a:solidFill>
+              </a:rPr>
+              <a:t>Part 3: Cloud Native Fabric Deployment (k8s)</a:t>
+            </a:r>
+          </a:p>
+        </p:txBody>
+      </p:sp>
+      <p:sp>
+        <p:nvSpPr>
+          <p:cNvPr id="46" name="TextBox 45">
+            <a:extLst>
+              <a:ext uri="{FF2B5EF4-FFF2-40B4-BE49-F238E27FC236}">
+                <a16:creationId xmlns:a16="http://schemas.microsoft.com/office/drawing/2014/main" id="{9DA0E3A6-F094-196B-78E3-A0F57B263AEF}"/>
+              </a:ext>
+            </a:extLst>
+          </p:cNvPr>
+          <p:cNvSpPr txBox="1"/>
+          <p:nvPr/>
+        </p:nvSpPr>
+        <p:spPr>
+          <a:xfrm>
+            <a:off x="2332796" y="36421"/>
+            <a:ext cx="7526408" cy="400110"/>
+          </a:xfrm>
+          <a:prstGeom prst="rect">
+            <a:avLst/>
+          </a:prstGeom>
+          <a:noFill/>
+        </p:spPr>
+        <p:txBody>
+          <a:bodyPr wrap="square">
+            <a:spAutoFit/>
+          </a:bodyPr>
+          <a:lstStyle/>
+          <a:p>
+            <a:r>
+              <a:rPr lang="en-US" sz="2000">
+                <a:hlinkClick r:id="rId2"/>
+              </a:rPr>
+              <a:t>https://github.com/hyperledgendary/full-stack-asset-transfer-guide</a:t>
+            </a:r>
+            <a:endParaRPr lang="en-US" sz="2000"/>
+          </a:p>
+        </p:txBody>
+      </p:sp>
+      <p:cxnSp>
+        <p:nvCxnSpPr>
+          <p:cNvPr id="48" name="Straight Connector 47">
+            <a:extLst>
+              <a:ext uri="{FF2B5EF4-FFF2-40B4-BE49-F238E27FC236}">
+                <a16:creationId xmlns:a16="http://schemas.microsoft.com/office/drawing/2014/main" id="{479A5F05-2A20-51F8-39A4-D094ECB418CC}"/>
+              </a:ext>
+            </a:extLst>
+          </p:cNvPr>
+          <p:cNvCxnSpPr/>
+          <p:nvPr/>
+        </p:nvCxnSpPr>
+        <p:spPr>
+          <a:xfrm flipH="1">
+            <a:off x="178904" y="3538330"/>
+            <a:ext cx="11767930" cy="0"/>
+          </a:xfrm>
+          <a:prstGeom prst="line">
+            <a:avLst/>
+          </a:prstGeom>
+          <a:ln w="15875">
+            <a:solidFill>
+              <a:schemeClr val="tx1"/>
+            </a:solidFill>
+          </a:ln>
+        </p:spPr>
+        <p:style>
+          <a:lnRef idx="1">
+            <a:schemeClr val="accent1"/>
+          </a:lnRef>
+          <a:fillRef idx="0">
+            <a:schemeClr val="accent1"/>
+          </a:fillRef>
+          <a:effectRef idx="0">
+            <a:schemeClr val="accent1"/>
+          </a:effectRef>
+          <a:fontRef idx="minor">
+            <a:schemeClr val="tx1"/>
+          </a:fontRef>
+        </p:style>
+      </p:cxnSp>
     </p:spTree>
     <p:extLst>
       <p:ext uri="{BB962C8B-B14F-4D97-AF65-F5344CB8AC3E}">
-        <p14:creationId xmlns:p14="http://schemas.microsoft.com/office/powerpoint/2010/main" val="2629084055"/>
+        <p14:creationId xmlns:p14="http://schemas.microsoft.com/office/powerpoint/2010/main" val="655584182"/>
       </p:ext>
     </p:extLst>
   </p:cSld>
@@ -7589,7 +8925,7 @@
           <a:lstStyle/>
           <a:p>
             <a:r>
-              <a:rPr lang="en-US" sz="1000">
+              <a:rPr lang="en-US" sz="1000" dirty="0">
                 <a:latin typeface="IBM Plex Mono" panose="020B0509050203000203" pitchFamily="49" charset="77"/>
               </a:rPr>
               <a:t>ca</a:t>
@@ -7597,7 +8933,7 @@
           </a:p>
           <a:p>
             <a:r>
-              <a:rPr lang="en-US" sz="1000">
+              <a:rPr lang="en-US" sz="1000" dirty="0">
                 <a:latin typeface="IBM Plex Mono" panose="020B0509050203000203" pitchFamily="49" charset="77"/>
               </a:rPr>
               <a:t>peer</a:t>
@@ -7605,15 +8941,18 @@
           </a:p>
           <a:p>
             <a:r>
-              <a:rPr lang="en-US" sz="1000">
+              <a:rPr lang="en-US" sz="1000" dirty="0" err="1">
                 <a:latin typeface="IBM Plex Mono" panose="020B0509050203000203" pitchFamily="49" charset="77"/>
               </a:rPr>
               <a:t>orderer</a:t>
             </a:r>
-          </a:p>
-          <a:p>
-            <a:r>
-              <a:rPr lang="en-US" sz="1000">
+            <a:endParaRPr lang="en-US" sz="1000" dirty="0">
+              <a:latin typeface="IBM Plex Mono" panose="020B0509050203000203" pitchFamily="49" charset="77"/>
+            </a:endParaRPr>
+          </a:p>
+          <a:p>
+            <a:r>
+              <a:rPr lang="en-US" sz="1000" dirty="0">
                 <a:latin typeface="IBM Plex Mono" panose="020B0509050203000203" pitchFamily="49" charset="77"/>
               </a:rPr>
               <a:t>console</a:t>

</xml_diff>